<commit_message>
wip GOAT 3.0 project page
</commit_message>
<xml_diff>
--- a/uploads/homepage/timeline.pptx
+++ b/uploads/homepage/timeline.pptx
@@ -8,6 +8,7 @@
     <p:sldId id="256" r:id="rId2"/>
     <p:sldId id="257" r:id="rId3"/>
     <p:sldId id="258" r:id="rId4"/>
+    <p:sldId id="259" r:id="rId5"/>
   </p:sldIdLst>
   <p:sldSz cx="12192000" cy="6858000"/>
   <p:notesSz cx="6858000" cy="9144000"/>
@@ -106,6 +107,11 @@
       </a:defRPr>
     </a:lvl9pPr>
   </p:defaultTextStyle>
+  <p:extLst>
+    <p:ext uri="{EFAFB233-063F-42B5-8137-9DF3F51BA10A}">
+      <p15:sldGuideLst xmlns:p15="http://schemas.microsoft.com/office/powerpoint/2012/main"/>
+    </p:ext>
+  </p:extLst>
 </p:presentation>
 </file>
 
@@ -240,7 +246,7 @@
           <a:p>
             <a:fld id="{2DAA1E6E-4179-485B-A277-B8242EF16EB6}" type="datetimeFigureOut">
               <a:rPr lang="en-US" smtClean="0"/>
-              <a:t>12/20/2021</a:t>
+              <a:t>1/27/2022</a:t>
             </a:fld>
             <a:endParaRPr lang="en-US"/>
           </a:p>
@@ -410,7 +416,7 @@
           <a:p>
             <a:fld id="{2DAA1E6E-4179-485B-A277-B8242EF16EB6}" type="datetimeFigureOut">
               <a:rPr lang="en-US" smtClean="0"/>
-              <a:t>12/20/2021</a:t>
+              <a:t>1/27/2022</a:t>
             </a:fld>
             <a:endParaRPr lang="en-US"/>
           </a:p>
@@ -590,7 +596,7 @@
           <a:p>
             <a:fld id="{2DAA1E6E-4179-485B-A277-B8242EF16EB6}" type="datetimeFigureOut">
               <a:rPr lang="en-US" smtClean="0"/>
-              <a:t>12/20/2021</a:t>
+              <a:t>1/27/2022</a:t>
             </a:fld>
             <a:endParaRPr lang="en-US"/>
           </a:p>
@@ -760,7 +766,7 @@
           <a:p>
             <a:fld id="{2DAA1E6E-4179-485B-A277-B8242EF16EB6}" type="datetimeFigureOut">
               <a:rPr lang="en-US" smtClean="0"/>
-              <a:t>12/20/2021</a:t>
+              <a:t>1/27/2022</a:t>
             </a:fld>
             <a:endParaRPr lang="en-US"/>
           </a:p>
@@ -1006,7 +1012,7 @@
           <a:p>
             <a:fld id="{2DAA1E6E-4179-485B-A277-B8242EF16EB6}" type="datetimeFigureOut">
               <a:rPr lang="en-US" smtClean="0"/>
-              <a:t>12/20/2021</a:t>
+              <a:t>1/27/2022</a:t>
             </a:fld>
             <a:endParaRPr lang="en-US"/>
           </a:p>
@@ -1238,7 +1244,7 @@
           <a:p>
             <a:fld id="{2DAA1E6E-4179-485B-A277-B8242EF16EB6}" type="datetimeFigureOut">
               <a:rPr lang="en-US" smtClean="0"/>
-              <a:t>12/20/2021</a:t>
+              <a:t>1/27/2022</a:t>
             </a:fld>
             <a:endParaRPr lang="en-US"/>
           </a:p>
@@ -1605,7 +1611,7 @@
           <a:p>
             <a:fld id="{2DAA1E6E-4179-485B-A277-B8242EF16EB6}" type="datetimeFigureOut">
               <a:rPr lang="en-US" smtClean="0"/>
-              <a:t>12/20/2021</a:t>
+              <a:t>1/27/2022</a:t>
             </a:fld>
             <a:endParaRPr lang="en-US"/>
           </a:p>
@@ -1723,7 +1729,7 @@
           <a:p>
             <a:fld id="{2DAA1E6E-4179-485B-A277-B8242EF16EB6}" type="datetimeFigureOut">
               <a:rPr lang="en-US" smtClean="0"/>
-              <a:t>12/20/2021</a:t>
+              <a:t>1/27/2022</a:t>
             </a:fld>
             <a:endParaRPr lang="en-US"/>
           </a:p>
@@ -1818,7 +1824,7 @@
           <a:p>
             <a:fld id="{2DAA1E6E-4179-485B-A277-B8242EF16EB6}" type="datetimeFigureOut">
               <a:rPr lang="en-US" smtClean="0"/>
-              <a:t>12/20/2021</a:t>
+              <a:t>1/27/2022</a:t>
             </a:fld>
             <a:endParaRPr lang="en-US"/>
           </a:p>
@@ -2095,7 +2101,7 @@
           <a:p>
             <a:fld id="{2DAA1E6E-4179-485B-A277-B8242EF16EB6}" type="datetimeFigureOut">
               <a:rPr lang="en-US" smtClean="0"/>
-              <a:t>12/20/2021</a:t>
+              <a:t>1/27/2022</a:t>
             </a:fld>
             <a:endParaRPr lang="en-US"/>
           </a:p>
@@ -2348,7 +2354,7 @@
           <a:p>
             <a:fld id="{2DAA1E6E-4179-485B-A277-B8242EF16EB6}" type="datetimeFigureOut">
               <a:rPr lang="en-US" smtClean="0"/>
-              <a:t>12/20/2021</a:t>
+              <a:t>1/27/2022</a:t>
             </a:fld>
             <a:endParaRPr lang="en-US"/>
           </a:p>
@@ -2561,7 +2567,7 @@
           <a:p>
             <a:fld id="{2DAA1E6E-4179-485B-A277-B8242EF16EB6}" type="datetimeFigureOut">
               <a:rPr lang="en-US" smtClean="0"/>
-              <a:t>12/20/2021</a:t>
+              <a:t>1/27/2022</a:t>
             </a:fld>
             <a:endParaRPr lang="en-US"/>
           </a:p>
@@ -7454,12 +7460,6 @@
               </a:rPr>
               <a:t>mFUND project “GOAT”</a:t>
             </a:r>
-            <a:endParaRPr lang="en-US" sz="1200" b="1" dirty="0">
-              <a:solidFill>
-                <a:schemeClr val="bg1"/>
-              </a:solidFill>
-              <a:latin typeface="Mulish" pitchFamily="2" charset="0"/>
-            </a:endParaRPr>
           </a:p>
         </p:txBody>
       </p:sp>
@@ -8990,6 +8990,2286 @@
     <p:extLst>
       <p:ext uri="{BB962C8B-B14F-4D97-AF65-F5344CB8AC3E}">
         <p14:creationId xmlns:p14="http://schemas.microsoft.com/office/powerpoint/2010/main" val="536979711"/>
+      </p:ext>
+    </p:extLst>
+  </p:cSld>
+  <p:clrMapOvr>
+    <a:masterClrMapping/>
+  </p:clrMapOvr>
+  <p:timing>
+    <p:tnLst>
+      <p:par>
+        <p:cTn id="1" dur="indefinite" restart="never" nodeType="tmRoot">
+          <p:childTnLst>
+            <p:seq concurrent="1" nextAc="seek">
+              <p:cTn id="2" dur="indefinite" nodeType="mainSeq">
+                <p:childTnLst>
+                  <p:par>
+                    <p:cTn id="3" fill="hold">
+                      <p:stCondLst>
+                        <p:cond delay="indefinite"/>
+                      </p:stCondLst>
+                      <p:childTnLst>
+                        <p:par>
+                          <p:cTn id="4" fill="hold">
+                            <p:stCondLst>
+                              <p:cond delay="0"/>
+                            </p:stCondLst>
+                            <p:childTnLst>
+                              <p:par>
+                                <p:cTn id="5" presetID="1" presetClass="entr" presetSubtype="0" fill="hold" nodeType="clickEffect">
+                                  <p:stCondLst>
+                                    <p:cond delay="0"/>
+                                  </p:stCondLst>
+                                  <p:childTnLst>
+                                    <p:set>
+                                      <p:cBhvr>
+                                        <p:cTn id="6" dur="1" fill="hold">
+                                          <p:stCondLst>
+                                            <p:cond delay="0"/>
+                                          </p:stCondLst>
+                                        </p:cTn>
+                                        <p:tgtEl>
+                                          <p:spTgt spid="13"/>
+                                        </p:tgtEl>
+                                        <p:attrNameLst>
+                                          <p:attrName>style.visibility</p:attrName>
+                                        </p:attrNameLst>
+                                      </p:cBhvr>
+                                      <p:to>
+                                        <p:strVal val="visible"/>
+                                      </p:to>
+                                    </p:set>
+                                  </p:childTnLst>
+                                </p:cTn>
+                              </p:par>
+                              <p:par>
+                                <p:cTn id="7" presetID="1" presetClass="entr" presetSubtype="0" fill="hold" nodeType="withEffect">
+                                  <p:stCondLst>
+                                    <p:cond delay="0"/>
+                                  </p:stCondLst>
+                                  <p:childTnLst>
+                                    <p:set>
+                                      <p:cBhvr>
+                                        <p:cTn id="8" dur="1" fill="hold">
+                                          <p:stCondLst>
+                                            <p:cond delay="0"/>
+                                          </p:stCondLst>
+                                        </p:cTn>
+                                        <p:tgtEl>
+                                          <p:spTgt spid="38"/>
+                                        </p:tgtEl>
+                                        <p:attrNameLst>
+                                          <p:attrName>style.visibility</p:attrName>
+                                        </p:attrNameLst>
+                                      </p:cBhvr>
+                                      <p:to>
+                                        <p:strVal val="visible"/>
+                                      </p:to>
+                                    </p:set>
+                                  </p:childTnLst>
+                                </p:cTn>
+                              </p:par>
+                              <p:par>
+                                <p:cTn id="9" presetID="1" presetClass="entr" presetSubtype="0" fill="hold" grpId="0" nodeType="withEffect">
+                                  <p:stCondLst>
+                                    <p:cond delay="0"/>
+                                  </p:stCondLst>
+                                  <p:childTnLst>
+                                    <p:set>
+                                      <p:cBhvr>
+                                        <p:cTn id="10" dur="1" fill="hold">
+                                          <p:stCondLst>
+                                            <p:cond delay="0"/>
+                                          </p:stCondLst>
+                                        </p:cTn>
+                                        <p:tgtEl>
+                                          <p:spTgt spid="9"/>
+                                        </p:tgtEl>
+                                        <p:attrNameLst>
+                                          <p:attrName>style.visibility</p:attrName>
+                                        </p:attrNameLst>
+                                      </p:cBhvr>
+                                      <p:to>
+                                        <p:strVal val="visible"/>
+                                      </p:to>
+                                    </p:set>
+                                  </p:childTnLst>
+                                </p:cTn>
+                              </p:par>
+                              <p:par>
+                                <p:cTn id="11" presetID="1" presetClass="entr" presetSubtype="0" fill="hold" nodeType="withEffect">
+                                  <p:stCondLst>
+                                    <p:cond delay="0"/>
+                                  </p:stCondLst>
+                                  <p:childTnLst>
+                                    <p:set>
+                                      <p:cBhvr>
+                                        <p:cTn id="12" dur="1" fill="hold">
+                                          <p:stCondLst>
+                                            <p:cond delay="0"/>
+                                          </p:stCondLst>
+                                        </p:cTn>
+                                        <p:tgtEl>
+                                          <p:spTgt spid="37"/>
+                                        </p:tgtEl>
+                                        <p:attrNameLst>
+                                          <p:attrName>style.visibility</p:attrName>
+                                        </p:attrNameLst>
+                                      </p:cBhvr>
+                                      <p:to>
+                                        <p:strVal val="visible"/>
+                                      </p:to>
+                                    </p:set>
+                                  </p:childTnLst>
+                                </p:cTn>
+                              </p:par>
+                            </p:childTnLst>
+                          </p:cTn>
+                        </p:par>
+                      </p:childTnLst>
+                    </p:cTn>
+                  </p:par>
+                  <p:par>
+                    <p:cTn id="13" fill="hold">
+                      <p:stCondLst>
+                        <p:cond delay="indefinite"/>
+                      </p:stCondLst>
+                      <p:childTnLst>
+                        <p:par>
+                          <p:cTn id="14" fill="hold">
+                            <p:stCondLst>
+                              <p:cond delay="0"/>
+                            </p:stCondLst>
+                            <p:childTnLst>
+                              <p:par>
+                                <p:cTn id="15" presetID="1" presetClass="entr" presetSubtype="0" fill="hold" nodeType="clickEffect">
+                                  <p:stCondLst>
+                                    <p:cond delay="0"/>
+                                  </p:stCondLst>
+                                  <p:childTnLst>
+                                    <p:set>
+                                      <p:cBhvr>
+                                        <p:cTn id="16" dur="1" fill="hold">
+                                          <p:stCondLst>
+                                            <p:cond delay="0"/>
+                                          </p:stCondLst>
+                                        </p:cTn>
+                                        <p:tgtEl>
+                                          <p:spTgt spid="44"/>
+                                        </p:tgtEl>
+                                        <p:attrNameLst>
+                                          <p:attrName>style.visibility</p:attrName>
+                                        </p:attrNameLst>
+                                      </p:cBhvr>
+                                      <p:to>
+                                        <p:strVal val="visible"/>
+                                      </p:to>
+                                    </p:set>
+                                  </p:childTnLst>
+                                </p:cTn>
+                              </p:par>
+                              <p:par>
+                                <p:cTn id="17" presetID="1" presetClass="entr" presetSubtype="0" fill="hold" grpId="0" nodeType="withEffect">
+                                  <p:stCondLst>
+                                    <p:cond delay="0"/>
+                                  </p:stCondLst>
+                                  <p:childTnLst>
+                                    <p:set>
+                                      <p:cBhvr>
+                                        <p:cTn id="18" dur="1" fill="hold">
+                                          <p:stCondLst>
+                                            <p:cond delay="0"/>
+                                          </p:stCondLst>
+                                        </p:cTn>
+                                        <p:tgtEl>
+                                          <p:spTgt spid="10"/>
+                                        </p:tgtEl>
+                                        <p:attrNameLst>
+                                          <p:attrName>style.visibility</p:attrName>
+                                        </p:attrNameLst>
+                                      </p:cBhvr>
+                                      <p:to>
+                                        <p:strVal val="visible"/>
+                                      </p:to>
+                                    </p:set>
+                                  </p:childTnLst>
+                                </p:cTn>
+                              </p:par>
+                            </p:childTnLst>
+                          </p:cTn>
+                        </p:par>
+                      </p:childTnLst>
+                    </p:cTn>
+                  </p:par>
+                  <p:par>
+                    <p:cTn id="19" fill="hold">
+                      <p:stCondLst>
+                        <p:cond delay="indefinite"/>
+                      </p:stCondLst>
+                      <p:childTnLst>
+                        <p:par>
+                          <p:cTn id="20" fill="hold">
+                            <p:stCondLst>
+                              <p:cond delay="0"/>
+                            </p:stCondLst>
+                            <p:childTnLst>
+                              <p:par>
+                                <p:cTn id="21" presetID="1" presetClass="entr" presetSubtype="0" fill="hold" nodeType="clickEffect">
+                                  <p:stCondLst>
+                                    <p:cond delay="0"/>
+                                  </p:stCondLst>
+                                  <p:childTnLst>
+                                    <p:set>
+                                      <p:cBhvr>
+                                        <p:cTn id="22" dur="1" fill="hold">
+                                          <p:stCondLst>
+                                            <p:cond delay="0"/>
+                                          </p:stCondLst>
+                                        </p:cTn>
+                                        <p:tgtEl>
+                                          <p:spTgt spid="40"/>
+                                        </p:tgtEl>
+                                        <p:attrNameLst>
+                                          <p:attrName>style.visibility</p:attrName>
+                                        </p:attrNameLst>
+                                      </p:cBhvr>
+                                      <p:to>
+                                        <p:strVal val="visible"/>
+                                      </p:to>
+                                    </p:set>
+                                  </p:childTnLst>
+                                </p:cTn>
+                              </p:par>
+                            </p:childTnLst>
+                          </p:cTn>
+                        </p:par>
+                      </p:childTnLst>
+                    </p:cTn>
+                  </p:par>
+                  <p:par>
+                    <p:cTn id="23" fill="hold">
+                      <p:stCondLst>
+                        <p:cond delay="indefinite"/>
+                      </p:stCondLst>
+                      <p:childTnLst>
+                        <p:par>
+                          <p:cTn id="24" fill="hold">
+                            <p:stCondLst>
+                              <p:cond delay="0"/>
+                            </p:stCondLst>
+                            <p:childTnLst>
+                              <p:par>
+                                <p:cTn id="25" presetID="1" presetClass="entr" presetSubtype="0" fill="hold" grpId="0" nodeType="clickEffect">
+                                  <p:stCondLst>
+                                    <p:cond delay="0"/>
+                                  </p:stCondLst>
+                                  <p:childTnLst>
+                                    <p:set>
+                                      <p:cBhvr>
+                                        <p:cTn id="26" dur="1" fill="hold">
+                                          <p:stCondLst>
+                                            <p:cond delay="0"/>
+                                          </p:stCondLst>
+                                        </p:cTn>
+                                        <p:tgtEl>
+                                          <p:spTgt spid="52"/>
+                                        </p:tgtEl>
+                                        <p:attrNameLst>
+                                          <p:attrName>style.visibility</p:attrName>
+                                        </p:attrNameLst>
+                                      </p:cBhvr>
+                                      <p:to>
+                                        <p:strVal val="visible"/>
+                                      </p:to>
+                                    </p:set>
+                                  </p:childTnLst>
+                                </p:cTn>
+                              </p:par>
+                              <p:par>
+                                <p:cTn id="27" presetID="1" presetClass="entr" presetSubtype="0" fill="hold" nodeType="withEffect">
+                                  <p:stCondLst>
+                                    <p:cond delay="0"/>
+                                  </p:stCondLst>
+                                  <p:childTnLst>
+                                    <p:set>
+                                      <p:cBhvr>
+                                        <p:cTn id="28" dur="1" fill="hold">
+                                          <p:stCondLst>
+                                            <p:cond delay="0"/>
+                                          </p:stCondLst>
+                                        </p:cTn>
+                                        <p:tgtEl>
+                                          <p:spTgt spid="57"/>
+                                        </p:tgtEl>
+                                        <p:attrNameLst>
+                                          <p:attrName>style.visibility</p:attrName>
+                                        </p:attrNameLst>
+                                      </p:cBhvr>
+                                      <p:to>
+                                        <p:strVal val="visible"/>
+                                      </p:to>
+                                    </p:set>
+                                  </p:childTnLst>
+                                </p:cTn>
+                              </p:par>
+                              <p:par>
+                                <p:cTn id="29" presetID="1" presetClass="entr" presetSubtype="0" fill="hold" nodeType="withEffect">
+                                  <p:stCondLst>
+                                    <p:cond delay="0"/>
+                                  </p:stCondLst>
+                                  <p:childTnLst>
+                                    <p:set>
+                                      <p:cBhvr>
+                                        <p:cTn id="30" dur="1" fill="hold">
+                                          <p:stCondLst>
+                                            <p:cond delay="0"/>
+                                          </p:stCondLst>
+                                        </p:cTn>
+                                        <p:tgtEl>
+                                          <p:spTgt spid="58"/>
+                                        </p:tgtEl>
+                                        <p:attrNameLst>
+                                          <p:attrName>style.visibility</p:attrName>
+                                        </p:attrNameLst>
+                                      </p:cBhvr>
+                                      <p:to>
+                                        <p:strVal val="visible"/>
+                                      </p:to>
+                                    </p:set>
+                                  </p:childTnLst>
+                                </p:cTn>
+                              </p:par>
+                              <p:par>
+                                <p:cTn id="31" presetID="1" presetClass="entr" presetSubtype="0" fill="hold" nodeType="withEffect">
+                                  <p:stCondLst>
+                                    <p:cond delay="0"/>
+                                  </p:stCondLst>
+                                  <p:childTnLst>
+                                    <p:set>
+                                      <p:cBhvr>
+                                        <p:cTn id="32" dur="1" fill="hold">
+                                          <p:stCondLst>
+                                            <p:cond delay="0"/>
+                                          </p:stCondLst>
+                                        </p:cTn>
+                                        <p:tgtEl>
+                                          <p:spTgt spid="33"/>
+                                        </p:tgtEl>
+                                        <p:attrNameLst>
+                                          <p:attrName>style.visibility</p:attrName>
+                                        </p:attrNameLst>
+                                      </p:cBhvr>
+                                      <p:to>
+                                        <p:strVal val="visible"/>
+                                      </p:to>
+                                    </p:set>
+                                  </p:childTnLst>
+                                </p:cTn>
+                              </p:par>
+                            </p:childTnLst>
+                          </p:cTn>
+                        </p:par>
+                      </p:childTnLst>
+                    </p:cTn>
+                  </p:par>
+                  <p:par>
+                    <p:cTn id="33" fill="hold">
+                      <p:stCondLst>
+                        <p:cond delay="indefinite"/>
+                      </p:stCondLst>
+                      <p:childTnLst>
+                        <p:par>
+                          <p:cTn id="34" fill="hold">
+                            <p:stCondLst>
+                              <p:cond delay="0"/>
+                            </p:stCondLst>
+                            <p:childTnLst>
+                              <p:par>
+                                <p:cTn id="35" presetID="1" presetClass="entr" presetSubtype="0" fill="hold" nodeType="clickEffect">
+                                  <p:stCondLst>
+                                    <p:cond delay="0"/>
+                                  </p:stCondLst>
+                                  <p:childTnLst>
+                                    <p:set>
+                                      <p:cBhvr>
+                                        <p:cTn id="36" dur="1" fill="hold">
+                                          <p:stCondLst>
+                                            <p:cond delay="0"/>
+                                          </p:stCondLst>
+                                        </p:cTn>
+                                        <p:tgtEl>
+                                          <p:spTgt spid="39"/>
+                                        </p:tgtEl>
+                                        <p:attrNameLst>
+                                          <p:attrName>style.visibility</p:attrName>
+                                        </p:attrNameLst>
+                                      </p:cBhvr>
+                                      <p:to>
+                                        <p:strVal val="visible"/>
+                                      </p:to>
+                                    </p:set>
+                                  </p:childTnLst>
+                                </p:cTn>
+                              </p:par>
+                              <p:par>
+                                <p:cTn id="37" presetID="1" presetClass="entr" presetSubtype="0" fill="hold" grpId="0" nodeType="withEffect">
+                                  <p:stCondLst>
+                                    <p:cond delay="0"/>
+                                  </p:stCondLst>
+                                  <p:childTnLst>
+                                    <p:set>
+                                      <p:cBhvr>
+                                        <p:cTn id="38" dur="1" fill="hold">
+                                          <p:stCondLst>
+                                            <p:cond delay="0"/>
+                                          </p:stCondLst>
+                                        </p:cTn>
+                                        <p:tgtEl>
+                                          <p:spTgt spid="50"/>
+                                        </p:tgtEl>
+                                        <p:attrNameLst>
+                                          <p:attrName>style.visibility</p:attrName>
+                                        </p:attrNameLst>
+                                      </p:cBhvr>
+                                      <p:to>
+                                        <p:strVal val="visible"/>
+                                      </p:to>
+                                    </p:set>
+                                  </p:childTnLst>
+                                </p:cTn>
+                              </p:par>
+                            </p:childTnLst>
+                          </p:cTn>
+                        </p:par>
+                      </p:childTnLst>
+                    </p:cTn>
+                  </p:par>
+                </p:childTnLst>
+              </p:cTn>
+              <p:prevCondLst>
+                <p:cond evt="onPrev" delay="0">
+                  <p:tgtEl>
+                    <p:sldTgt/>
+                  </p:tgtEl>
+                </p:cond>
+              </p:prevCondLst>
+              <p:nextCondLst>
+                <p:cond evt="onNext" delay="0">
+                  <p:tgtEl>
+                    <p:sldTgt/>
+                  </p:tgtEl>
+                </p:cond>
+              </p:nextCondLst>
+            </p:seq>
+          </p:childTnLst>
+        </p:cTn>
+      </p:par>
+    </p:tnLst>
+    <p:bldLst>
+      <p:bldP spid="9" grpId="0"/>
+      <p:bldP spid="10" grpId="0"/>
+      <p:bldP spid="52" grpId="0"/>
+      <p:bldP spid="50" grpId="0"/>
+    </p:bldLst>
+  </p:timing>
+</p:sld>
+</file>
+
+<file path=ppt/slides/slide4.xml><?xml version="1.0" encoding="utf-8"?>
+<p:sld xmlns:a="http://schemas.openxmlformats.org/drawingml/2006/main" xmlns:r="http://schemas.openxmlformats.org/officeDocument/2006/relationships" xmlns:p="http://schemas.openxmlformats.org/presentationml/2006/main">
+  <p:cSld>
+    <p:spTree>
+      <p:nvGrpSpPr>
+        <p:cNvPr id="1" name=""/>
+        <p:cNvGrpSpPr/>
+        <p:nvPr/>
+      </p:nvGrpSpPr>
+      <p:grpSpPr>
+        <a:xfrm>
+          <a:off x="0" y="0"/>
+          <a:ext cx="0" cy="0"/>
+          <a:chOff x="0" y="0"/>
+          <a:chExt cx="0" cy="0"/>
+        </a:xfrm>
+      </p:grpSpPr>
+      <p:sp>
+        <p:nvSpPr>
+          <p:cNvPr id="59" name="Rechteck 58"/>
+          <p:cNvSpPr/>
+          <p:nvPr/>
+        </p:nvSpPr>
+        <p:spPr>
+          <a:xfrm>
+            <a:off x="290972" y="884379"/>
+            <a:ext cx="10103759" cy="5728138"/>
+          </a:xfrm>
+          <a:prstGeom prst="rect">
+            <a:avLst/>
+          </a:prstGeom>
+          <a:solidFill>
+            <a:schemeClr val="accent3">
+              <a:lumMod val="20000"/>
+              <a:lumOff val="80000"/>
+            </a:schemeClr>
+          </a:solidFill>
+          <a:ln>
+            <a:noFill/>
+          </a:ln>
+        </p:spPr>
+        <p:style>
+          <a:lnRef idx="2">
+            <a:schemeClr val="accent1">
+              <a:shade val="50000"/>
+            </a:schemeClr>
+          </a:lnRef>
+          <a:fillRef idx="1">
+            <a:schemeClr val="accent1"/>
+          </a:fillRef>
+          <a:effectRef idx="0">
+            <a:schemeClr val="accent1"/>
+          </a:effectRef>
+          <a:fontRef idx="minor">
+            <a:schemeClr val="lt1"/>
+          </a:fontRef>
+        </p:style>
+        <p:txBody>
+          <a:bodyPr rtlCol="0" anchor="ctr"/>
+          <a:lstStyle/>
+          <a:p>
+            <a:pPr algn="ctr"/>
+            <a:endParaRPr lang="en-US"/>
+          </a:p>
+        </p:txBody>
+      </p:sp>
+      <p:sp>
+        <p:nvSpPr>
+          <p:cNvPr id="4" name="Pfeil nach rechts 3">
+            <a:extLst>
+              <a:ext uri="{FF2B5EF4-FFF2-40B4-BE49-F238E27FC236}">
+                <a16:creationId xmlns:a16="http://schemas.microsoft.com/office/drawing/2014/main" id="{3BFD5D1E-F107-9B48-B7A2-7FB25FFD42FB}"/>
+              </a:ext>
+            </a:extLst>
+          </p:cNvPr>
+          <p:cNvSpPr/>
+          <p:nvPr/>
+        </p:nvSpPr>
+        <p:spPr>
+          <a:xfrm>
+            <a:off x="708917" y="3748448"/>
+            <a:ext cx="9322140" cy="558266"/>
+          </a:xfrm>
+          <a:prstGeom prst="rightArrow">
+            <a:avLst/>
+          </a:prstGeom>
+          <a:solidFill>
+            <a:schemeClr val="bg1">
+              <a:lumMod val="85000"/>
+            </a:schemeClr>
+          </a:solidFill>
+          <a:ln>
+            <a:noFill/>
+          </a:ln>
+        </p:spPr>
+        <p:style>
+          <a:lnRef idx="2">
+            <a:schemeClr val="accent1">
+              <a:shade val="50000"/>
+            </a:schemeClr>
+          </a:lnRef>
+          <a:fillRef idx="1">
+            <a:schemeClr val="accent1"/>
+          </a:fillRef>
+          <a:effectRef idx="0">
+            <a:schemeClr val="accent1"/>
+          </a:effectRef>
+          <a:fontRef idx="minor">
+            <a:schemeClr val="lt1"/>
+          </a:fontRef>
+        </p:style>
+        <p:txBody>
+          <a:bodyPr rot="0" spcFirstLastPara="0" vertOverflow="overflow" horzOverflow="overflow" vert="horz" wrap="square" lIns="91440" tIns="45720" rIns="91440" bIns="45720" numCol="1" spcCol="0" rtlCol="0" fromWordArt="0" anchor="t" anchorCtr="0" forceAA="0" compatLnSpc="1">
+            <a:prstTxWarp prst="textNoShape">
+              <a:avLst/>
+            </a:prstTxWarp>
+            <a:noAutofit/>
+          </a:bodyPr>
+          <a:lstStyle/>
+          <a:p>
+            <a:pPr algn="ctr">
+              <a:lnSpc>
+                <a:spcPct val="114000"/>
+              </a:lnSpc>
+            </a:pPr>
+            <a:endParaRPr lang="en-US" dirty="0">
+              <a:solidFill>
+                <a:schemeClr val="tx1"/>
+              </a:solidFill>
+              <a:latin typeface="Mulish" pitchFamily="2" charset="0"/>
+            </a:endParaRPr>
+          </a:p>
+        </p:txBody>
+      </p:sp>
+      <p:sp>
+        <p:nvSpPr>
+          <p:cNvPr id="36" name="Pfeil nach rechts 35">
+            <a:extLst>
+              <a:ext uri="{FF2B5EF4-FFF2-40B4-BE49-F238E27FC236}">
+                <a16:creationId xmlns:a16="http://schemas.microsoft.com/office/drawing/2014/main" id="{3BFD5D1E-F107-9B48-B7A2-7FB25FFD42FB}"/>
+              </a:ext>
+            </a:extLst>
+          </p:cNvPr>
+          <p:cNvSpPr/>
+          <p:nvPr/>
+        </p:nvSpPr>
+        <p:spPr>
+          <a:xfrm>
+            <a:off x="7296921" y="3754488"/>
+            <a:ext cx="2734136" cy="552226"/>
+          </a:xfrm>
+          <a:prstGeom prst="rightArrow">
+            <a:avLst/>
+          </a:prstGeom>
+          <a:solidFill>
+            <a:srgbClr val="2BB381">
+              <a:alpha val="50196"/>
+            </a:srgbClr>
+          </a:solidFill>
+          <a:ln>
+            <a:noFill/>
+          </a:ln>
+        </p:spPr>
+        <p:style>
+          <a:lnRef idx="2">
+            <a:schemeClr val="accent1">
+              <a:shade val="50000"/>
+            </a:schemeClr>
+          </a:lnRef>
+          <a:fillRef idx="1">
+            <a:schemeClr val="accent1"/>
+          </a:fillRef>
+          <a:effectRef idx="0">
+            <a:schemeClr val="accent1"/>
+          </a:effectRef>
+          <a:fontRef idx="minor">
+            <a:schemeClr val="lt1"/>
+          </a:fontRef>
+        </p:style>
+        <p:txBody>
+          <a:bodyPr rot="0" spcFirstLastPara="0" vertOverflow="overflow" horzOverflow="overflow" vert="horz" wrap="square" lIns="91440" tIns="45720" rIns="91440" bIns="45720" numCol="1" spcCol="0" rtlCol="0" fromWordArt="0" anchor="t" anchorCtr="0" forceAA="0" compatLnSpc="1">
+            <a:prstTxWarp prst="textNoShape">
+              <a:avLst/>
+            </a:prstTxWarp>
+            <a:noAutofit/>
+          </a:bodyPr>
+          <a:lstStyle/>
+          <a:p>
+            <a:pPr algn="ctr">
+              <a:lnSpc>
+                <a:spcPct val="114000"/>
+              </a:lnSpc>
+            </a:pPr>
+            <a:r>
+              <a:rPr lang="en-US" sz="1200" b="1" dirty="0" smtClean="0">
+                <a:solidFill>
+                  <a:schemeClr val="bg1"/>
+                </a:solidFill>
+                <a:latin typeface="Mulish" pitchFamily="2" charset="0"/>
+              </a:rPr>
+              <a:t>mFUND project “GOAT 3.0”</a:t>
+            </a:r>
+            <a:endParaRPr lang="en-US" sz="1200" b="1" dirty="0">
+              <a:solidFill>
+                <a:schemeClr val="bg1"/>
+              </a:solidFill>
+              <a:latin typeface="Mulish" pitchFamily="2" charset="0"/>
+            </a:endParaRPr>
+          </a:p>
+        </p:txBody>
+      </p:sp>
+      <p:sp>
+        <p:nvSpPr>
+          <p:cNvPr id="2" name="Rechteck 1"/>
+          <p:cNvSpPr/>
+          <p:nvPr/>
+        </p:nvSpPr>
+        <p:spPr>
+          <a:xfrm>
+            <a:off x="2573223" y="3884434"/>
+            <a:ext cx="3495265" cy="280192"/>
+          </a:xfrm>
+          <a:prstGeom prst="rect">
+            <a:avLst/>
+          </a:prstGeom>
+          <a:solidFill>
+            <a:srgbClr val="2BB381">
+              <a:alpha val="50196"/>
+            </a:srgbClr>
+          </a:solidFill>
+          <a:ln>
+            <a:noFill/>
+          </a:ln>
+        </p:spPr>
+        <p:style>
+          <a:lnRef idx="2">
+            <a:schemeClr val="accent1">
+              <a:shade val="50000"/>
+            </a:schemeClr>
+          </a:lnRef>
+          <a:fillRef idx="1">
+            <a:schemeClr val="accent1"/>
+          </a:fillRef>
+          <a:effectRef idx="0">
+            <a:schemeClr val="accent1"/>
+          </a:effectRef>
+          <a:fontRef idx="minor">
+            <a:schemeClr val="lt1"/>
+          </a:fontRef>
+        </p:style>
+        <p:txBody>
+          <a:bodyPr rtlCol="0" anchor="ctr"/>
+          <a:lstStyle/>
+          <a:p>
+            <a:pPr algn="ctr"/>
+            <a:r>
+              <a:rPr lang="en-US" sz="1200" b="1" dirty="0">
+                <a:solidFill>
+                  <a:schemeClr val="bg1"/>
+                </a:solidFill>
+                <a:latin typeface="Mulish" pitchFamily="2" charset="0"/>
+              </a:rPr>
+              <a:t>mFUND project “GOAT”</a:t>
+            </a:r>
+          </a:p>
+        </p:txBody>
+      </p:sp>
+      <p:sp>
+        <p:nvSpPr>
+          <p:cNvPr id="5" name="Textfeld 4">
+            <a:extLst>
+              <a:ext uri="{FF2B5EF4-FFF2-40B4-BE49-F238E27FC236}">
+                <a16:creationId xmlns:a16="http://schemas.microsoft.com/office/drawing/2014/main" id="{4C318AF0-834F-1040-B737-9ECA707EBE42}"/>
+              </a:ext>
+            </a:extLst>
+          </p:cNvPr>
+          <p:cNvSpPr txBox="1"/>
+          <p:nvPr/>
+        </p:nvSpPr>
+        <p:spPr>
+          <a:xfrm>
+            <a:off x="783023" y="4164626"/>
+            <a:ext cx="526729" cy="245580"/>
+          </a:xfrm>
+          <a:prstGeom prst="rect">
+            <a:avLst/>
+          </a:prstGeom>
+          <a:noFill/>
+        </p:spPr>
+        <p:txBody>
+          <a:bodyPr wrap="square" lIns="0" tIns="0" rIns="0" bIns="0" rtlCol="0">
+            <a:spAutoFit/>
+          </a:bodyPr>
+          <a:lstStyle/>
+          <a:p>
+            <a:pPr algn="ctr">
+              <a:lnSpc>
+                <a:spcPct val="114000"/>
+              </a:lnSpc>
+            </a:pPr>
+            <a:r>
+              <a:rPr lang="de-DE" sz="1400" dirty="0">
+                <a:latin typeface="Mulish" pitchFamily="2" charset="0"/>
+              </a:rPr>
+              <a:t>2017</a:t>
+            </a:r>
+            <a:endParaRPr lang="en-US" sz="1400" dirty="0" err="1">
+              <a:latin typeface="Mulish" pitchFamily="2" charset="0"/>
+            </a:endParaRPr>
+          </a:p>
+        </p:txBody>
+      </p:sp>
+      <p:sp>
+        <p:nvSpPr>
+          <p:cNvPr id="9" name="Textfeld 8">
+            <a:extLst>
+              <a:ext uri="{FF2B5EF4-FFF2-40B4-BE49-F238E27FC236}">
+                <a16:creationId xmlns:a16="http://schemas.microsoft.com/office/drawing/2014/main" id="{A4CD35A0-359A-B343-A1E9-7F944ACD008A}"/>
+              </a:ext>
+            </a:extLst>
+          </p:cNvPr>
+          <p:cNvSpPr txBox="1"/>
+          <p:nvPr/>
+        </p:nvSpPr>
+        <p:spPr>
+          <a:xfrm>
+            <a:off x="1430590" y="3910831"/>
+            <a:ext cx="526729" cy="245580"/>
+          </a:xfrm>
+          <a:prstGeom prst="rect">
+            <a:avLst/>
+          </a:prstGeom>
+          <a:noFill/>
+        </p:spPr>
+        <p:txBody>
+          <a:bodyPr wrap="square" lIns="0" tIns="0" rIns="0" bIns="0" rtlCol="0">
+            <a:spAutoFit/>
+          </a:bodyPr>
+          <a:lstStyle/>
+          <a:p>
+            <a:pPr algn="ctr">
+              <a:lnSpc>
+                <a:spcPct val="114000"/>
+              </a:lnSpc>
+            </a:pPr>
+            <a:r>
+              <a:rPr lang="de-DE" sz="1400" dirty="0">
+                <a:latin typeface="Mulish" pitchFamily="2" charset="0"/>
+              </a:rPr>
+              <a:t>…</a:t>
+            </a:r>
+            <a:endParaRPr lang="en-US" sz="1400" dirty="0" err="1">
+              <a:latin typeface="Mulish" pitchFamily="2" charset="0"/>
+            </a:endParaRPr>
+          </a:p>
+        </p:txBody>
+      </p:sp>
+      <p:sp>
+        <p:nvSpPr>
+          <p:cNvPr id="10" name="Textfeld 9">
+            <a:extLst>
+              <a:ext uri="{FF2B5EF4-FFF2-40B4-BE49-F238E27FC236}">
+                <a16:creationId xmlns:a16="http://schemas.microsoft.com/office/drawing/2014/main" id="{70997DFD-CC06-A146-BFA8-6153849640E3}"/>
+              </a:ext>
+            </a:extLst>
+          </p:cNvPr>
+          <p:cNvSpPr txBox="1"/>
+          <p:nvPr/>
+        </p:nvSpPr>
+        <p:spPr>
+          <a:xfrm>
+            <a:off x="6284109" y="4164626"/>
+            <a:ext cx="526729" cy="245580"/>
+          </a:xfrm>
+          <a:prstGeom prst="rect">
+            <a:avLst/>
+          </a:prstGeom>
+          <a:noFill/>
+        </p:spPr>
+        <p:txBody>
+          <a:bodyPr wrap="square" lIns="0" tIns="0" rIns="0" bIns="0" rtlCol="0">
+            <a:spAutoFit/>
+          </a:bodyPr>
+          <a:lstStyle/>
+          <a:p>
+            <a:pPr algn="ctr">
+              <a:lnSpc>
+                <a:spcPct val="114000"/>
+              </a:lnSpc>
+            </a:pPr>
+            <a:r>
+              <a:rPr lang="de-DE" sz="1400" dirty="0">
+                <a:latin typeface="Mulish" pitchFamily="2" charset="0"/>
+              </a:rPr>
+              <a:t>2021</a:t>
+            </a:r>
+            <a:endParaRPr lang="en-US" sz="1400" dirty="0" err="1">
+              <a:latin typeface="Mulish" pitchFamily="2" charset="0"/>
+            </a:endParaRPr>
+          </a:p>
+        </p:txBody>
+      </p:sp>
+      <p:sp>
+        <p:nvSpPr>
+          <p:cNvPr id="11" name="Textfeld 10">
+            <a:extLst>
+              <a:ext uri="{FF2B5EF4-FFF2-40B4-BE49-F238E27FC236}">
+                <a16:creationId xmlns:a16="http://schemas.microsoft.com/office/drawing/2014/main" id="{D94E2DF7-1A58-CD44-8CF9-0B74B9B1180C}"/>
+              </a:ext>
+            </a:extLst>
+          </p:cNvPr>
+          <p:cNvSpPr txBox="1"/>
+          <p:nvPr/>
+        </p:nvSpPr>
+        <p:spPr>
+          <a:xfrm>
+            <a:off x="613677" y="2376917"/>
+            <a:ext cx="910506" cy="227113"/>
+          </a:xfrm>
+          <a:prstGeom prst="rect">
+            <a:avLst/>
+          </a:prstGeom>
+          <a:noFill/>
+        </p:spPr>
+        <p:txBody>
+          <a:bodyPr wrap="none" lIns="0" tIns="0" rIns="0" bIns="0" rtlCol="0">
+            <a:spAutoFit/>
+          </a:bodyPr>
+          <a:lstStyle/>
+          <a:p>
+            <a:pPr>
+              <a:lnSpc>
+                <a:spcPct val="114000"/>
+              </a:lnSpc>
+            </a:pPr>
+            <a:r>
+              <a:rPr lang="en-US" sz="1400" dirty="0">
+                <a:solidFill>
+                  <a:srgbClr val="283648"/>
+                </a:solidFill>
+                <a:latin typeface="Mulish" pitchFamily="2" charset="0"/>
+              </a:rPr>
+              <a:t>1. </a:t>
+            </a:r>
+            <a:r>
+              <a:rPr lang="en-US" sz="1400" dirty="0" err="1">
+                <a:solidFill>
+                  <a:srgbClr val="283648"/>
+                </a:solidFill>
+                <a:latin typeface="Mulish" pitchFamily="2" charset="0"/>
+              </a:rPr>
+              <a:t>Prototyp</a:t>
+            </a:r>
+            <a:endParaRPr lang="en-US" sz="1400" dirty="0">
+              <a:solidFill>
+                <a:srgbClr val="283648"/>
+              </a:solidFill>
+              <a:latin typeface="Mulish" pitchFamily="2" charset="0"/>
+            </a:endParaRPr>
+          </a:p>
+        </p:txBody>
+      </p:sp>
+      <p:grpSp>
+        <p:nvGrpSpPr>
+          <p:cNvPr id="13" name="Gruppieren 12">
+            <a:extLst>
+              <a:ext uri="{FF2B5EF4-FFF2-40B4-BE49-F238E27FC236}">
+                <a16:creationId xmlns:a16="http://schemas.microsoft.com/office/drawing/2014/main" id="{0E10E28D-0ABA-BD41-9548-8D285F520FFC}"/>
+              </a:ext>
+            </a:extLst>
+          </p:cNvPr>
+          <p:cNvGrpSpPr/>
+          <p:nvPr/>
+        </p:nvGrpSpPr>
+        <p:grpSpPr>
+          <a:xfrm>
+            <a:off x="2044423" y="1853968"/>
+            <a:ext cx="1068664" cy="2014018"/>
+            <a:chOff x="973070" y="1875538"/>
+            <a:chExt cx="1068664" cy="2014018"/>
+          </a:xfrm>
+        </p:grpSpPr>
+        <p:cxnSp>
+          <p:nvCxnSpPr>
+            <p:cNvPr id="14" name="Gerader Verbinder 68">
+              <a:extLst>
+                <a:ext uri="{FF2B5EF4-FFF2-40B4-BE49-F238E27FC236}">
+                  <a16:creationId xmlns:a16="http://schemas.microsoft.com/office/drawing/2014/main" id="{0ECA597E-DF3F-B746-A086-9B761EB7C4E1}"/>
+                </a:ext>
+              </a:extLst>
+            </p:cNvPr>
+            <p:cNvCxnSpPr/>
+            <p:nvPr/>
+          </p:nvCxnSpPr>
+          <p:spPr>
+            <a:xfrm>
+              <a:off x="1501871" y="2779141"/>
+              <a:ext cx="1" cy="1110415"/>
+            </a:xfrm>
+            <a:prstGeom prst="line">
+              <a:avLst/>
+            </a:prstGeom>
+            <a:ln>
+              <a:solidFill>
+                <a:srgbClr val="283648"/>
+              </a:solidFill>
+              <a:tailEnd type="oval"/>
+            </a:ln>
+          </p:spPr>
+          <p:style>
+            <a:lnRef idx="1">
+              <a:schemeClr val="accent1"/>
+            </a:lnRef>
+            <a:fillRef idx="0">
+              <a:schemeClr val="accent1"/>
+            </a:fillRef>
+            <a:effectRef idx="0">
+              <a:schemeClr val="accent1"/>
+            </a:effectRef>
+            <a:fontRef idx="minor">
+              <a:schemeClr val="tx1"/>
+            </a:fontRef>
+          </p:style>
+        </p:cxnSp>
+        <p:sp>
+          <p:nvSpPr>
+            <p:cNvPr id="15" name="Textfeld 14">
+              <a:extLst>
+                <a:ext uri="{FF2B5EF4-FFF2-40B4-BE49-F238E27FC236}">
+                  <a16:creationId xmlns:a16="http://schemas.microsoft.com/office/drawing/2014/main" id="{82BA3B77-F664-F346-9C04-E45EEA92AD36}"/>
+                </a:ext>
+              </a:extLst>
+            </p:cNvPr>
+            <p:cNvSpPr txBox="1"/>
+            <p:nvPr/>
+          </p:nvSpPr>
+          <p:spPr>
+            <a:xfrm>
+              <a:off x="973070" y="1875538"/>
+              <a:ext cx="1068664" cy="736740"/>
+            </a:xfrm>
+            <a:prstGeom prst="rect">
+              <a:avLst/>
+            </a:prstGeom>
+            <a:noFill/>
+          </p:spPr>
+          <p:txBody>
+            <a:bodyPr wrap="square" lIns="0" tIns="0" rIns="0" bIns="0" rtlCol="0">
+              <a:spAutoFit/>
+            </a:bodyPr>
+            <a:lstStyle/>
+            <a:p>
+              <a:pPr algn="ctr">
+                <a:lnSpc>
+                  <a:spcPct val="114000"/>
+                </a:lnSpc>
+              </a:pPr>
+              <a:r>
+                <a:rPr lang="en-US" sz="1400" dirty="0">
+                  <a:solidFill>
+                    <a:srgbClr val="283648"/>
+                  </a:solidFill>
+                  <a:latin typeface="Mulish" pitchFamily="2" charset="0"/>
+                </a:rPr>
+                <a:t>Kick-Off </a:t>
+              </a:r>
+              <a:r>
+                <a:rPr lang="en-US" sz="1400" dirty="0" smtClean="0">
+                  <a:solidFill>
+                    <a:srgbClr val="283648"/>
+                  </a:solidFill>
+                  <a:latin typeface="Mulish" pitchFamily="2" charset="0"/>
+                </a:rPr>
+                <a:t>1. mFUND </a:t>
+              </a:r>
+              <a:r>
+                <a:rPr lang="en-US" sz="1400" dirty="0">
+                  <a:solidFill>
+                    <a:srgbClr val="283648"/>
+                  </a:solidFill>
+                  <a:latin typeface="Mulish" pitchFamily="2" charset="0"/>
+                </a:rPr>
+                <a:t>funding</a:t>
+              </a:r>
+            </a:p>
+          </p:txBody>
+        </p:sp>
+      </p:grpSp>
+      <p:cxnSp>
+        <p:nvCxnSpPr>
+          <p:cNvPr id="37" name="Gerader Verbinder 24">
+            <a:extLst>
+              <a:ext uri="{FF2B5EF4-FFF2-40B4-BE49-F238E27FC236}">
+                <a16:creationId xmlns:a16="http://schemas.microsoft.com/office/drawing/2014/main" id="{049E9182-DA64-894B-B4C6-8EE7718D277B}"/>
+              </a:ext>
+            </a:extLst>
+          </p:cNvPr>
+          <p:cNvCxnSpPr/>
+          <p:nvPr/>
+        </p:nvCxnSpPr>
+        <p:spPr>
+          <a:xfrm>
+            <a:off x="1896394" y="3884435"/>
+            <a:ext cx="0" cy="280688"/>
+          </a:xfrm>
+          <a:prstGeom prst="line">
+            <a:avLst/>
+          </a:prstGeom>
+        </p:spPr>
+        <p:style>
+          <a:lnRef idx="1">
+            <a:schemeClr val="dk1"/>
+          </a:lnRef>
+          <a:fillRef idx="0">
+            <a:schemeClr val="dk1"/>
+          </a:fillRef>
+          <a:effectRef idx="0">
+            <a:schemeClr val="dk1"/>
+          </a:effectRef>
+          <a:fontRef idx="minor">
+            <a:schemeClr val="tx1"/>
+          </a:fontRef>
+        </p:style>
+      </p:cxnSp>
+      <p:cxnSp>
+        <p:nvCxnSpPr>
+          <p:cNvPr id="38" name="Gerader Verbinder 80">
+            <a:extLst>
+              <a:ext uri="{FF2B5EF4-FFF2-40B4-BE49-F238E27FC236}">
+                <a16:creationId xmlns:a16="http://schemas.microsoft.com/office/drawing/2014/main" id="{C1441854-FDF2-2346-BE10-5CA3D5B6C237}"/>
+              </a:ext>
+            </a:extLst>
+          </p:cNvPr>
+          <p:cNvCxnSpPr/>
+          <p:nvPr/>
+        </p:nvCxnSpPr>
+        <p:spPr>
+          <a:xfrm>
+            <a:off x="1430590" y="3884435"/>
+            <a:ext cx="0" cy="280688"/>
+          </a:xfrm>
+          <a:prstGeom prst="line">
+            <a:avLst/>
+          </a:prstGeom>
+        </p:spPr>
+        <p:style>
+          <a:lnRef idx="1">
+            <a:schemeClr val="dk1"/>
+          </a:lnRef>
+          <a:fillRef idx="0">
+            <a:schemeClr val="dk1"/>
+          </a:fillRef>
+          <a:effectRef idx="0">
+            <a:schemeClr val="dk1"/>
+          </a:effectRef>
+          <a:fontRef idx="minor">
+            <a:schemeClr val="tx1"/>
+          </a:fontRef>
+        </p:style>
+      </p:cxnSp>
+      <p:grpSp>
+        <p:nvGrpSpPr>
+          <p:cNvPr id="40" name="Gruppieren 39">
+            <a:extLst>
+              <a:ext uri="{FF2B5EF4-FFF2-40B4-BE49-F238E27FC236}">
+                <a16:creationId xmlns:a16="http://schemas.microsoft.com/office/drawing/2014/main" id="{C91344A8-3A73-6E42-818C-D1547A2CF07E}"/>
+              </a:ext>
+            </a:extLst>
+          </p:cNvPr>
+          <p:cNvGrpSpPr/>
+          <p:nvPr/>
+        </p:nvGrpSpPr>
+        <p:grpSpPr>
+          <a:xfrm>
+            <a:off x="5326137" y="4159141"/>
+            <a:ext cx="1548795" cy="2059327"/>
+            <a:chOff x="5463654" y="4159141"/>
+            <a:chExt cx="1548795" cy="2059327"/>
+          </a:xfrm>
+        </p:grpSpPr>
+        <p:sp>
+          <p:nvSpPr>
+            <p:cNvPr id="41" name="Textfeld 40">
+              <a:extLst>
+                <a:ext uri="{FF2B5EF4-FFF2-40B4-BE49-F238E27FC236}">
+                  <a16:creationId xmlns:a16="http://schemas.microsoft.com/office/drawing/2014/main" id="{FB2A491F-7F44-6A4E-972F-8CCA604B74EE}"/>
+                </a:ext>
+              </a:extLst>
+            </p:cNvPr>
+            <p:cNvSpPr txBox="1"/>
+            <p:nvPr/>
+          </p:nvSpPr>
+          <p:spPr>
+            <a:xfrm>
+              <a:off x="5463654" y="5481728"/>
+              <a:ext cx="1548795" cy="736740"/>
+            </a:xfrm>
+            <a:prstGeom prst="rect">
+              <a:avLst/>
+            </a:prstGeom>
+            <a:noFill/>
+          </p:spPr>
+          <p:txBody>
+            <a:bodyPr wrap="square" lIns="0" tIns="0" rIns="0" bIns="0" rtlCol="0">
+              <a:spAutoFit/>
+            </a:bodyPr>
+            <a:lstStyle/>
+            <a:p>
+              <a:pPr algn="ctr">
+                <a:lnSpc>
+                  <a:spcPct val="114000"/>
+                </a:lnSpc>
+              </a:pPr>
+              <a:r>
+                <a:rPr lang="en-US" sz="1400" dirty="0">
+                  <a:latin typeface="Mulish" pitchFamily="2" charset="0"/>
+                </a:rPr>
+                <a:t>Release GOAT 1.0</a:t>
+              </a:r>
+            </a:p>
+            <a:p>
+              <a:pPr algn="ctr">
+                <a:lnSpc>
+                  <a:spcPct val="114000"/>
+                </a:lnSpc>
+              </a:pPr>
+              <a:r>
+                <a:rPr lang="en-US" sz="1400" dirty="0" smtClean="0">
+                  <a:latin typeface="Mulish" pitchFamily="2" charset="0"/>
+                </a:rPr>
+                <a:t>End of 1. mFUND funding</a:t>
+              </a:r>
+              <a:endParaRPr lang="en-US" sz="1400" dirty="0">
+                <a:latin typeface="Mulish" pitchFamily="2" charset="0"/>
+              </a:endParaRPr>
+            </a:p>
+          </p:txBody>
+        </p:sp>
+        <p:pic>
+          <p:nvPicPr>
+            <p:cNvPr id="42" name="Grafik 41">
+              <a:extLst>
+                <a:ext uri="{FF2B5EF4-FFF2-40B4-BE49-F238E27FC236}">
+                  <a16:creationId xmlns:a16="http://schemas.microsoft.com/office/drawing/2014/main" id="{1F2BAFEF-369D-2243-A107-BDD022A27C06}"/>
+                </a:ext>
+              </a:extLst>
+            </p:cNvPr>
+            <p:cNvPicPr>
+              <a:picLocks noChangeAspect="1"/>
+            </p:cNvPicPr>
+            <p:nvPr/>
+          </p:nvPicPr>
+          <p:blipFill>
+            <a:blip r:embed="rId2" cstate="print">
+              <a:extLst>
+                <a:ext uri="{28A0092B-C50C-407E-A947-70E740481C1C}">
+                  <a14:useLocalDpi xmlns:a14="http://schemas.microsoft.com/office/drawing/2010/main" val="0"/>
+                </a:ext>
+              </a:extLst>
+            </a:blip>
+            <a:stretch>
+              <a:fillRect/>
+            </a:stretch>
+          </p:blipFill>
+          <p:spPr>
+            <a:xfrm>
+              <a:off x="5951249" y="4925423"/>
+              <a:ext cx="527301" cy="526051"/>
+            </a:xfrm>
+            <a:prstGeom prst="rect">
+              <a:avLst/>
+            </a:prstGeom>
+          </p:spPr>
+        </p:pic>
+        <p:cxnSp>
+          <p:nvCxnSpPr>
+            <p:cNvPr id="43" name="Gerader Verbinder 91">
+              <a:extLst>
+                <a:ext uri="{FF2B5EF4-FFF2-40B4-BE49-F238E27FC236}">
+                  <a16:creationId xmlns:a16="http://schemas.microsoft.com/office/drawing/2014/main" id="{8C1E7457-C76A-2F4F-AA42-0DD7A1A423F8}"/>
+                </a:ext>
+              </a:extLst>
+            </p:cNvPr>
+            <p:cNvCxnSpPr/>
+            <p:nvPr/>
+          </p:nvCxnSpPr>
+          <p:spPr>
+            <a:xfrm flipH="1">
+              <a:off x="6206005" y="4159141"/>
+              <a:ext cx="248" cy="662790"/>
+            </a:xfrm>
+            <a:prstGeom prst="line">
+              <a:avLst/>
+            </a:prstGeom>
+            <a:ln>
+              <a:solidFill>
+                <a:srgbClr val="283648"/>
+              </a:solidFill>
+              <a:headEnd type="oval"/>
+            </a:ln>
+          </p:spPr>
+          <p:style>
+            <a:lnRef idx="1">
+              <a:schemeClr val="accent1"/>
+            </a:lnRef>
+            <a:fillRef idx="0">
+              <a:schemeClr val="accent1"/>
+            </a:fillRef>
+            <a:effectRef idx="0">
+              <a:schemeClr val="accent1"/>
+            </a:effectRef>
+            <a:fontRef idx="minor">
+              <a:schemeClr val="tx1"/>
+            </a:fontRef>
+          </p:style>
+        </p:cxnSp>
+      </p:grpSp>
+      <p:grpSp>
+        <p:nvGrpSpPr>
+          <p:cNvPr id="44" name="Gruppieren 43">
+            <a:extLst>
+              <a:ext uri="{FF2B5EF4-FFF2-40B4-BE49-F238E27FC236}">
+                <a16:creationId xmlns:a16="http://schemas.microsoft.com/office/drawing/2014/main" id="{5B241DC3-C7FF-D34E-AF26-22D58ED297C9}"/>
+              </a:ext>
+            </a:extLst>
+          </p:cNvPr>
+          <p:cNvGrpSpPr/>
+          <p:nvPr/>
+        </p:nvGrpSpPr>
+        <p:grpSpPr>
+          <a:xfrm>
+            <a:off x="5094189" y="2014407"/>
+            <a:ext cx="1503609" cy="1871234"/>
+            <a:chOff x="4782971" y="2014407"/>
+            <a:chExt cx="1503609" cy="1871234"/>
+          </a:xfrm>
+        </p:grpSpPr>
+        <p:cxnSp>
+          <p:nvCxnSpPr>
+            <p:cNvPr id="45" name="Gerader Verbinder 93">
+              <a:extLst>
+                <a:ext uri="{FF2B5EF4-FFF2-40B4-BE49-F238E27FC236}">
+                  <a16:creationId xmlns:a16="http://schemas.microsoft.com/office/drawing/2014/main" id="{2EAAC711-BE8C-E94A-A69B-CC32FEBC29EB}"/>
+                </a:ext>
+              </a:extLst>
+            </p:cNvPr>
+            <p:cNvCxnSpPr/>
+            <p:nvPr/>
+          </p:nvCxnSpPr>
+          <p:spPr>
+            <a:xfrm>
+              <a:off x="5519544" y="2738526"/>
+              <a:ext cx="0" cy="1147115"/>
+            </a:xfrm>
+            <a:prstGeom prst="line">
+              <a:avLst/>
+            </a:prstGeom>
+            <a:ln>
+              <a:solidFill>
+                <a:srgbClr val="283648"/>
+              </a:solidFill>
+              <a:tailEnd type="oval"/>
+            </a:ln>
+          </p:spPr>
+          <p:style>
+            <a:lnRef idx="1">
+              <a:schemeClr val="accent1"/>
+            </a:lnRef>
+            <a:fillRef idx="0">
+              <a:schemeClr val="accent1"/>
+            </a:fillRef>
+            <a:effectRef idx="0">
+              <a:schemeClr val="accent1"/>
+            </a:effectRef>
+            <a:fontRef idx="minor">
+              <a:schemeClr val="tx1"/>
+            </a:fontRef>
+          </p:style>
+        </p:cxnSp>
+        <p:pic>
+          <p:nvPicPr>
+            <p:cNvPr id="46" name="Grafik 45">
+              <a:extLst>
+                <a:ext uri="{FF2B5EF4-FFF2-40B4-BE49-F238E27FC236}">
+                  <a16:creationId xmlns:a16="http://schemas.microsoft.com/office/drawing/2014/main" id="{EB866F4C-44A1-CA4A-B5AC-527A81CA08A3}"/>
+                </a:ext>
+              </a:extLst>
+            </p:cNvPr>
+            <p:cNvPicPr>
+              <a:picLocks noChangeAspect="1"/>
+            </p:cNvPicPr>
+            <p:nvPr/>
+          </p:nvPicPr>
+          <p:blipFill rotWithShape="1">
+            <a:blip r:embed="rId3" cstate="print">
+              <a:extLst>
+                <a:ext uri="{28A0092B-C50C-407E-A947-70E740481C1C}">
+                  <a14:useLocalDpi xmlns:a14="http://schemas.microsoft.com/office/drawing/2010/main" val="0"/>
+                </a:ext>
+              </a:extLst>
+            </a:blip>
+            <a:srcRect l="10658" t="39906" r="10844" b="36808"/>
+            <a:stretch/>
+          </p:blipFill>
+          <p:spPr>
+            <a:xfrm>
+              <a:off x="4990830" y="2321630"/>
+              <a:ext cx="1087889" cy="322723"/>
+            </a:xfrm>
+            <a:prstGeom prst="rect">
+              <a:avLst/>
+            </a:prstGeom>
+          </p:spPr>
+        </p:pic>
+        <p:sp>
+          <p:nvSpPr>
+            <p:cNvPr id="47" name="Textfeld 46">
+              <a:extLst>
+                <a:ext uri="{FF2B5EF4-FFF2-40B4-BE49-F238E27FC236}">
+                  <a16:creationId xmlns:a16="http://schemas.microsoft.com/office/drawing/2014/main" id="{F0D6A97E-AE0B-564D-AE79-8CB4B62BF0F5}"/>
+                </a:ext>
+              </a:extLst>
+            </p:cNvPr>
+            <p:cNvSpPr txBox="1"/>
+            <p:nvPr/>
+          </p:nvSpPr>
+          <p:spPr>
+            <a:xfrm>
+              <a:off x="4782971" y="2014407"/>
+              <a:ext cx="1503609" cy="227113"/>
+            </a:xfrm>
+            <a:prstGeom prst="rect">
+              <a:avLst/>
+            </a:prstGeom>
+            <a:noFill/>
+          </p:spPr>
+          <p:txBody>
+            <a:bodyPr wrap="square" lIns="0" tIns="0" rIns="0" bIns="0" rtlCol="0">
+              <a:spAutoFit/>
+            </a:bodyPr>
+            <a:lstStyle/>
+            <a:p>
+              <a:pPr algn="ctr">
+                <a:lnSpc>
+                  <a:spcPct val="114000"/>
+                </a:lnSpc>
+              </a:pPr>
+              <a:r>
+                <a:rPr lang="en-US" sz="1400" dirty="0">
+                  <a:solidFill>
+                    <a:srgbClr val="283648"/>
+                  </a:solidFill>
+                  <a:latin typeface="Mulish" pitchFamily="2" charset="0"/>
+                </a:rPr>
+                <a:t>Founding startup</a:t>
+              </a:r>
+            </a:p>
+          </p:txBody>
+        </p:sp>
+      </p:grpSp>
+      <p:sp>
+        <p:nvSpPr>
+          <p:cNvPr id="52" name="Textfeld 51">
+            <a:extLst>
+              <a:ext uri="{FF2B5EF4-FFF2-40B4-BE49-F238E27FC236}">
+                <a16:creationId xmlns:a16="http://schemas.microsoft.com/office/drawing/2014/main" id="{568FDD33-5D4B-B14C-B844-D0A878FF4BAD}"/>
+              </a:ext>
+            </a:extLst>
+          </p:cNvPr>
+          <p:cNvSpPr txBox="1"/>
+          <p:nvPr/>
+        </p:nvSpPr>
+        <p:spPr>
+          <a:xfrm>
+            <a:off x="7626384" y="2861066"/>
+            <a:ext cx="2046033" cy="718274"/>
+          </a:xfrm>
+          <a:prstGeom prst="rect">
+            <a:avLst/>
+          </a:prstGeom>
+          <a:noFill/>
+        </p:spPr>
+        <p:txBody>
+          <a:bodyPr wrap="square" lIns="0" tIns="0" rIns="0" bIns="0" rtlCol="0">
+            <a:spAutoFit/>
+          </a:bodyPr>
+          <a:lstStyle/>
+          <a:p>
+            <a:pPr algn="ctr">
+              <a:lnSpc>
+                <a:spcPct val="114000"/>
+              </a:lnSpc>
+            </a:pPr>
+            <a:r>
+              <a:rPr lang="en-US" sz="1400" b="1" dirty="0">
+                <a:solidFill>
+                  <a:srgbClr val="283648"/>
+                </a:solidFill>
+                <a:latin typeface="Mulish" pitchFamily="2" charset="0"/>
+              </a:rPr>
+              <a:t>Further </a:t>
+            </a:r>
+            <a:r>
+              <a:rPr lang="en-US" sz="1400" b="1" dirty="0" smtClean="0">
+                <a:solidFill>
+                  <a:srgbClr val="283648"/>
+                </a:solidFill>
+                <a:latin typeface="Mulish" pitchFamily="2" charset="0"/>
+              </a:rPr>
+              <a:t>development and application </a:t>
+            </a:r>
+            <a:r>
+              <a:rPr lang="en-US" sz="1400" b="1" dirty="0">
+                <a:solidFill>
+                  <a:srgbClr val="283648"/>
+                </a:solidFill>
+                <a:latin typeface="Mulish" pitchFamily="2" charset="0"/>
+              </a:rPr>
+              <a:t>in research and practice  </a:t>
+            </a:r>
+          </a:p>
+        </p:txBody>
+      </p:sp>
+      <p:grpSp>
+        <p:nvGrpSpPr>
+          <p:cNvPr id="3" name="Gruppieren 2"/>
+          <p:cNvGrpSpPr/>
+          <p:nvPr/>
+        </p:nvGrpSpPr>
+        <p:grpSpPr>
+          <a:xfrm>
+            <a:off x="3425788" y="2349514"/>
+            <a:ext cx="1503609" cy="1476176"/>
+            <a:chOff x="2525098" y="4657356"/>
+            <a:chExt cx="1503609" cy="1476176"/>
+          </a:xfrm>
+        </p:grpSpPr>
+        <p:sp>
+          <p:nvSpPr>
+            <p:cNvPr id="53" name="Textfeld 52">
+              <a:extLst>
+                <a:ext uri="{FF2B5EF4-FFF2-40B4-BE49-F238E27FC236}">
+                  <a16:creationId xmlns:a16="http://schemas.microsoft.com/office/drawing/2014/main" id="{F0D6A97E-AE0B-564D-AE79-8CB4B62BF0F5}"/>
+                </a:ext>
+              </a:extLst>
+            </p:cNvPr>
+            <p:cNvSpPr txBox="1"/>
+            <p:nvPr/>
+          </p:nvSpPr>
+          <p:spPr>
+            <a:xfrm>
+              <a:off x="2525098" y="4657356"/>
+              <a:ext cx="1503609" cy="1227900"/>
+            </a:xfrm>
+            <a:prstGeom prst="rect">
+              <a:avLst/>
+            </a:prstGeom>
+            <a:noFill/>
+          </p:spPr>
+          <p:txBody>
+            <a:bodyPr wrap="square" lIns="0" tIns="0" rIns="0" bIns="0" rtlCol="0">
+              <a:spAutoFit/>
+            </a:bodyPr>
+            <a:lstStyle/>
+            <a:p>
+              <a:pPr algn="ctr">
+                <a:lnSpc>
+                  <a:spcPct val="114000"/>
+                </a:lnSpc>
+              </a:pPr>
+              <a:r>
+                <a:rPr lang="en-US" sz="1400" b="1" dirty="0" smtClean="0">
+                  <a:solidFill>
+                    <a:srgbClr val="283648"/>
+                  </a:solidFill>
+                  <a:latin typeface="Mulish" pitchFamily="2" charset="0"/>
+                </a:rPr>
+                <a:t>Co-creative development</a:t>
+              </a:r>
+              <a:r>
+                <a:rPr lang="en-US" sz="1400" dirty="0" smtClean="0">
+                  <a:solidFill>
+                    <a:srgbClr val="283648"/>
+                  </a:solidFill>
+                  <a:latin typeface="Mulish" pitchFamily="2" charset="0"/>
+                </a:rPr>
+                <a:t/>
+              </a:r>
+              <a:br>
+                <a:rPr lang="en-US" sz="1400" dirty="0" smtClean="0">
+                  <a:solidFill>
+                    <a:srgbClr val="283648"/>
+                  </a:solidFill>
+                  <a:latin typeface="Mulish" pitchFamily="2" charset="0"/>
+                </a:rPr>
+              </a:br>
+              <a:r>
+                <a:rPr lang="en-US" sz="1400" dirty="0" smtClean="0">
+                  <a:solidFill>
+                    <a:srgbClr val="283648"/>
+                  </a:solidFill>
+                  <a:latin typeface="Mulish" pitchFamily="2" charset="0"/>
+                </a:rPr>
+                <a:t>10 workshops with different municipalities </a:t>
+              </a:r>
+              <a:endParaRPr lang="en-US" sz="1400" dirty="0">
+                <a:solidFill>
+                  <a:srgbClr val="283648"/>
+                </a:solidFill>
+                <a:latin typeface="Mulish" pitchFamily="2" charset="0"/>
+              </a:endParaRPr>
+            </a:p>
+          </p:txBody>
+        </p:sp>
+        <p:sp>
+          <p:nvSpPr>
+            <p:cNvPr id="54" name="Nach oben gekrümmter Pfeil 53">
+              <a:extLst>
+                <a:ext uri="{FF2B5EF4-FFF2-40B4-BE49-F238E27FC236}">
+                  <a16:creationId xmlns:a16="http://schemas.microsoft.com/office/drawing/2014/main" id="{F945F35A-BFA0-5D44-8A1A-F8B402FC423C}"/>
+                </a:ext>
+              </a:extLst>
+            </p:cNvPr>
+            <p:cNvSpPr/>
+            <p:nvPr/>
+          </p:nvSpPr>
+          <p:spPr>
+            <a:xfrm rot="16200000">
+              <a:off x="3254945" y="5934636"/>
+              <a:ext cx="204709" cy="148277"/>
+            </a:xfrm>
+            <a:prstGeom prst="curvedUpArrow">
+              <a:avLst/>
+            </a:prstGeom>
+            <a:solidFill>
+              <a:srgbClr val="283648"/>
+            </a:solidFill>
+            <a:ln>
+              <a:noFill/>
+            </a:ln>
+          </p:spPr>
+          <p:style>
+            <a:lnRef idx="2">
+              <a:schemeClr val="accent1">
+                <a:shade val="50000"/>
+              </a:schemeClr>
+            </a:lnRef>
+            <a:fillRef idx="1">
+              <a:schemeClr val="accent1"/>
+            </a:fillRef>
+            <a:effectRef idx="0">
+              <a:schemeClr val="accent1"/>
+            </a:effectRef>
+            <a:fontRef idx="minor">
+              <a:schemeClr val="lt1"/>
+            </a:fontRef>
+          </p:style>
+          <p:txBody>
+            <a:bodyPr rot="0" spcFirstLastPara="0" vertOverflow="overflow" horzOverflow="overflow" vert="horz" wrap="square" lIns="91440" tIns="45720" rIns="91440" bIns="45720" numCol="1" spcCol="0" rtlCol="0" fromWordArt="0" anchor="t" anchorCtr="0" forceAA="0" compatLnSpc="1">
+              <a:prstTxWarp prst="textNoShape">
+                <a:avLst/>
+              </a:prstTxWarp>
+              <a:noAutofit/>
+            </a:bodyPr>
+            <a:lstStyle/>
+            <a:p>
+              <a:pPr algn="ctr">
+                <a:lnSpc>
+                  <a:spcPct val="114000"/>
+                </a:lnSpc>
+              </a:pPr>
+              <a:endParaRPr lang="en-US" dirty="0">
+                <a:solidFill>
+                  <a:schemeClr val="tx1"/>
+                </a:solidFill>
+                <a:latin typeface="Mulish" pitchFamily="2" charset="0"/>
+              </a:endParaRPr>
+            </a:p>
+          </p:txBody>
+        </p:sp>
+        <p:sp>
+          <p:nvSpPr>
+            <p:cNvPr id="55" name="Nach oben gekrümmter Pfeil 54">
+              <a:extLst>
+                <a:ext uri="{FF2B5EF4-FFF2-40B4-BE49-F238E27FC236}">
+                  <a16:creationId xmlns:a16="http://schemas.microsoft.com/office/drawing/2014/main" id="{3D0E118E-FFF6-B844-BEC3-3A11AF7B3F5A}"/>
+                </a:ext>
+              </a:extLst>
+            </p:cNvPr>
+            <p:cNvSpPr/>
+            <p:nvPr/>
+          </p:nvSpPr>
+          <p:spPr>
+            <a:xfrm rot="16200000" flipH="1" flipV="1">
+              <a:off x="3069238" y="5957039"/>
+              <a:ext cx="204709" cy="148277"/>
+            </a:xfrm>
+            <a:prstGeom prst="curvedUpArrow">
+              <a:avLst/>
+            </a:prstGeom>
+            <a:solidFill>
+              <a:srgbClr val="283648"/>
+            </a:solidFill>
+            <a:ln>
+              <a:noFill/>
+            </a:ln>
+          </p:spPr>
+          <p:style>
+            <a:lnRef idx="2">
+              <a:schemeClr val="accent1">
+                <a:shade val="50000"/>
+              </a:schemeClr>
+            </a:lnRef>
+            <a:fillRef idx="1">
+              <a:schemeClr val="accent1"/>
+            </a:fillRef>
+            <a:effectRef idx="0">
+              <a:schemeClr val="accent1"/>
+            </a:effectRef>
+            <a:fontRef idx="minor">
+              <a:schemeClr val="lt1"/>
+            </a:fontRef>
+          </p:style>
+          <p:txBody>
+            <a:bodyPr rot="0" spcFirstLastPara="0" vertOverflow="overflow" horzOverflow="overflow" vert="horz" wrap="square" lIns="91440" tIns="45720" rIns="91440" bIns="45720" numCol="1" spcCol="0" rtlCol="0" fromWordArt="0" anchor="t" anchorCtr="0" forceAA="0" compatLnSpc="1">
+              <a:prstTxWarp prst="textNoShape">
+                <a:avLst/>
+              </a:prstTxWarp>
+              <a:noAutofit/>
+            </a:bodyPr>
+            <a:lstStyle/>
+            <a:p>
+              <a:pPr algn="ctr">
+                <a:lnSpc>
+                  <a:spcPct val="114000"/>
+                </a:lnSpc>
+              </a:pPr>
+              <a:endParaRPr lang="en-US" dirty="0">
+                <a:solidFill>
+                  <a:schemeClr val="tx1"/>
+                </a:solidFill>
+                <a:latin typeface="Mulish" pitchFamily="2" charset="0"/>
+              </a:endParaRPr>
+            </a:p>
+          </p:txBody>
+        </p:sp>
+      </p:grpSp>
+      <p:sp>
+        <p:nvSpPr>
+          <p:cNvPr id="56" name="Textfeld 55">
+            <a:extLst>
+              <a:ext uri="{FF2B5EF4-FFF2-40B4-BE49-F238E27FC236}">
+                <a16:creationId xmlns:a16="http://schemas.microsoft.com/office/drawing/2014/main" id="{4C318AF0-834F-1040-B737-9ECA707EBE42}"/>
+              </a:ext>
+            </a:extLst>
+          </p:cNvPr>
+          <p:cNvSpPr txBox="1"/>
+          <p:nvPr/>
+        </p:nvSpPr>
+        <p:spPr>
+          <a:xfrm>
+            <a:off x="2023508" y="4156411"/>
+            <a:ext cx="526729" cy="227113"/>
+          </a:xfrm>
+          <a:prstGeom prst="rect">
+            <a:avLst/>
+          </a:prstGeom>
+          <a:noFill/>
+        </p:spPr>
+        <p:txBody>
+          <a:bodyPr wrap="square" lIns="0" tIns="0" rIns="0" bIns="0" rtlCol="0">
+            <a:spAutoFit/>
+          </a:bodyPr>
+          <a:lstStyle/>
+          <a:p>
+            <a:pPr algn="ctr">
+              <a:lnSpc>
+                <a:spcPct val="114000"/>
+              </a:lnSpc>
+            </a:pPr>
+            <a:r>
+              <a:rPr lang="de-DE" sz="1400" dirty="0" smtClean="0">
+                <a:latin typeface="Mulish" pitchFamily="2" charset="0"/>
+              </a:rPr>
+              <a:t>2019</a:t>
+            </a:r>
+            <a:endParaRPr lang="en-US" sz="1400" dirty="0" err="1">
+              <a:latin typeface="Mulish" pitchFamily="2" charset="0"/>
+            </a:endParaRPr>
+          </a:p>
+        </p:txBody>
+      </p:sp>
+      <p:cxnSp>
+        <p:nvCxnSpPr>
+          <p:cNvPr id="57" name="Gerader Verbinder 24">
+            <a:extLst>
+              <a:ext uri="{FF2B5EF4-FFF2-40B4-BE49-F238E27FC236}">
+                <a16:creationId xmlns:a16="http://schemas.microsoft.com/office/drawing/2014/main" id="{049E9182-DA64-894B-B4C6-8EE7718D277B}"/>
+              </a:ext>
+            </a:extLst>
+          </p:cNvPr>
+          <p:cNvCxnSpPr/>
+          <p:nvPr/>
+        </p:nvCxnSpPr>
+        <p:spPr>
+          <a:xfrm>
+            <a:off x="2685792" y="3884435"/>
+            <a:ext cx="0" cy="280688"/>
+          </a:xfrm>
+          <a:prstGeom prst="line">
+            <a:avLst/>
+          </a:prstGeom>
+        </p:spPr>
+        <p:style>
+          <a:lnRef idx="1">
+            <a:schemeClr val="dk1"/>
+          </a:lnRef>
+          <a:fillRef idx="0">
+            <a:schemeClr val="dk1"/>
+          </a:fillRef>
+          <a:effectRef idx="0">
+            <a:schemeClr val="dk1"/>
+          </a:effectRef>
+          <a:fontRef idx="minor">
+            <a:schemeClr val="tx1"/>
+          </a:fontRef>
+        </p:style>
+      </p:cxnSp>
+      <p:cxnSp>
+        <p:nvCxnSpPr>
+          <p:cNvPr id="58" name="Gerader Verbinder 24">
+            <a:extLst>
+              <a:ext uri="{FF2B5EF4-FFF2-40B4-BE49-F238E27FC236}">
+                <a16:creationId xmlns:a16="http://schemas.microsoft.com/office/drawing/2014/main" id="{049E9182-DA64-894B-B4C6-8EE7718D277B}"/>
+              </a:ext>
+            </a:extLst>
+          </p:cNvPr>
+          <p:cNvCxnSpPr/>
+          <p:nvPr/>
+        </p:nvCxnSpPr>
+        <p:spPr>
+          <a:xfrm>
+            <a:off x="5687270" y="3884435"/>
+            <a:ext cx="0" cy="280688"/>
+          </a:xfrm>
+          <a:prstGeom prst="line">
+            <a:avLst/>
+          </a:prstGeom>
+        </p:spPr>
+        <p:style>
+          <a:lnRef idx="1">
+            <a:schemeClr val="dk1"/>
+          </a:lnRef>
+          <a:fillRef idx="0">
+            <a:schemeClr val="dk1"/>
+          </a:fillRef>
+          <a:effectRef idx="0">
+            <a:schemeClr val="dk1"/>
+          </a:effectRef>
+          <a:fontRef idx="minor">
+            <a:schemeClr val="tx1"/>
+          </a:fontRef>
+        </p:style>
+      </p:cxnSp>
+      <p:cxnSp>
+        <p:nvCxnSpPr>
+          <p:cNvPr id="31" name="Gerader Verbinder 68">
+            <a:extLst>
+              <a:ext uri="{FF2B5EF4-FFF2-40B4-BE49-F238E27FC236}">
+                <a16:creationId xmlns:a16="http://schemas.microsoft.com/office/drawing/2014/main" id="{0ECA597E-DF3F-B746-A086-9B761EB7C4E1}"/>
+              </a:ext>
+            </a:extLst>
+          </p:cNvPr>
+          <p:cNvCxnSpPr/>
+          <p:nvPr/>
+        </p:nvCxnSpPr>
+        <p:spPr>
+          <a:xfrm>
+            <a:off x="1046388" y="2757570"/>
+            <a:ext cx="1" cy="1110415"/>
+          </a:xfrm>
+          <a:prstGeom prst="line">
+            <a:avLst/>
+          </a:prstGeom>
+          <a:ln>
+            <a:solidFill>
+              <a:srgbClr val="283648"/>
+            </a:solidFill>
+            <a:tailEnd type="oval"/>
+          </a:ln>
+        </p:spPr>
+        <p:style>
+          <a:lnRef idx="1">
+            <a:schemeClr val="accent1"/>
+          </a:lnRef>
+          <a:fillRef idx="0">
+            <a:schemeClr val="accent1"/>
+          </a:fillRef>
+          <a:effectRef idx="0">
+            <a:schemeClr val="accent1"/>
+          </a:effectRef>
+          <a:fontRef idx="minor">
+            <a:schemeClr val="tx1"/>
+          </a:fontRef>
+        </p:style>
+      </p:cxnSp>
+      <p:sp>
+        <p:nvSpPr>
+          <p:cNvPr id="32" name="Textfeld 31">
+            <a:extLst>
+              <a:ext uri="{FF2B5EF4-FFF2-40B4-BE49-F238E27FC236}">
+                <a16:creationId xmlns:a16="http://schemas.microsoft.com/office/drawing/2014/main" id="{4C318AF0-834F-1040-B737-9ECA707EBE42}"/>
+              </a:ext>
+            </a:extLst>
+          </p:cNvPr>
+          <p:cNvSpPr txBox="1"/>
+          <p:nvPr/>
+        </p:nvSpPr>
+        <p:spPr>
+          <a:xfrm>
+            <a:off x="3914227" y="4164626"/>
+            <a:ext cx="526729" cy="227113"/>
+          </a:xfrm>
+          <a:prstGeom prst="rect">
+            <a:avLst/>
+          </a:prstGeom>
+          <a:noFill/>
+        </p:spPr>
+        <p:txBody>
+          <a:bodyPr wrap="square" lIns="0" tIns="0" rIns="0" bIns="0" rtlCol="0">
+            <a:spAutoFit/>
+          </a:bodyPr>
+          <a:lstStyle/>
+          <a:p>
+            <a:pPr algn="ctr">
+              <a:lnSpc>
+                <a:spcPct val="114000"/>
+              </a:lnSpc>
+            </a:pPr>
+            <a:r>
+              <a:rPr lang="de-DE" sz="1400" dirty="0" smtClean="0">
+                <a:latin typeface="Mulish" pitchFamily="2" charset="0"/>
+              </a:rPr>
+              <a:t>2020</a:t>
+            </a:r>
+            <a:endParaRPr lang="en-US" sz="1400" dirty="0" err="1">
+              <a:latin typeface="Mulish" pitchFamily="2" charset="0"/>
+            </a:endParaRPr>
+          </a:p>
+        </p:txBody>
+      </p:sp>
+      <p:cxnSp>
+        <p:nvCxnSpPr>
+          <p:cNvPr id="33" name="Gerader Verbinder 24">
+            <a:extLst>
+              <a:ext uri="{FF2B5EF4-FFF2-40B4-BE49-F238E27FC236}">
+                <a16:creationId xmlns:a16="http://schemas.microsoft.com/office/drawing/2014/main" id="{049E9182-DA64-894B-B4C6-8EE7718D277B}"/>
+              </a:ext>
+            </a:extLst>
+          </p:cNvPr>
+          <p:cNvCxnSpPr/>
+          <p:nvPr/>
+        </p:nvCxnSpPr>
+        <p:spPr>
+          <a:xfrm>
+            <a:off x="7422936" y="3893277"/>
+            <a:ext cx="0" cy="280688"/>
+          </a:xfrm>
+          <a:prstGeom prst="line">
+            <a:avLst/>
+          </a:prstGeom>
+        </p:spPr>
+        <p:style>
+          <a:lnRef idx="1">
+            <a:schemeClr val="dk1"/>
+          </a:lnRef>
+          <a:fillRef idx="0">
+            <a:schemeClr val="dk1"/>
+          </a:fillRef>
+          <a:effectRef idx="0">
+            <a:schemeClr val="dk1"/>
+          </a:effectRef>
+          <a:fontRef idx="minor">
+            <a:schemeClr val="tx1"/>
+          </a:fontRef>
+        </p:style>
+      </p:cxnSp>
+      <p:grpSp>
+        <p:nvGrpSpPr>
+          <p:cNvPr id="39" name="Gruppieren 38">
+            <a:extLst>
+              <a:ext uri="{FF2B5EF4-FFF2-40B4-BE49-F238E27FC236}">
+                <a16:creationId xmlns:a16="http://schemas.microsoft.com/office/drawing/2014/main" id="{0E10E28D-0ABA-BD41-9548-8D285F520FFC}"/>
+              </a:ext>
+            </a:extLst>
+          </p:cNvPr>
+          <p:cNvGrpSpPr/>
+          <p:nvPr/>
+        </p:nvGrpSpPr>
+        <p:grpSpPr>
+          <a:xfrm>
+            <a:off x="6762589" y="1853228"/>
+            <a:ext cx="1068664" cy="2014018"/>
+            <a:chOff x="973070" y="1875538"/>
+            <a:chExt cx="1068664" cy="2014018"/>
+          </a:xfrm>
+        </p:grpSpPr>
+        <p:cxnSp>
+          <p:nvCxnSpPr>
+            <p:cNvPr id="48" name="Gerader Verbinder 68">
+              <a:extLst>
+                <a:ext uri="{FF2B5EF4-FFF2-40B4-BE49-F238E27FC236}">
+                  <a16:creationId xmlns:a16="http://schemas.microsoft.com/office/drawing/2014/main" id="{0ECA597E-DF3F-B746-A086-9B761EB7C4E1}"/>
+                </a:ext>
+              </a:extLst>
+            </p:cNvPr>
+            <p:cNvCxnSpPr/>
+            <p:nvPr/>
+          </p:nvCxnSpPr>
+          <p:spPr>
+            <a:xfrm>
+              <a:off x="1501871" y="2779141"/>
+              <a:ext cx="1" cy="1110415"/>
+            </a:xfrm>
+            <a:prstGeom prst="line">
+              <a:avLst/>
+            </a:prstGeom>
+            <a:ln>
+              <a:solidFill>
+                <a:srgbClr val="283648"/>
+              </a:solidFill>
+              <a:tailEnd type="oval"/>
+            </a:ln>
+          </p:spPr>
+          <p:style>
+            <a:lnRef idx="1">
+              <a:schemeClr val="accent1"/>
+            </a:lnRef>
+            <a:fillRef idx="0">
+              <a:schemeClr val="accent1"/>
+            </a:fillRef>
+            <a:effectRef idx="0">
+              <a:schemeClr val="accent1"/>
+            </a:effectRef>
+            <a:fontRef idx="minor">
+              <a:schemeClr val="tx1"/>
+            </a:fontRef>
+          </p:style>
+        </p:cxnSp>
+        <p:sp>
+          <p:nvSpPr>
+            <p:cNvPr id="49" name="Textfeld 48">
+              <a:extLst>
+                <a:ext uri="{FF2B5EF4-FFF2-40B4-BE49-F238E27FC236}">
+                  <a16:creationId xmlns:a16="http://schemas.microsoft.com/office/drawing/2014/main" id="{82BA3B77-F664-F346-9C04-E45EEA92AD36}"/>
+                </a:ext>
+              </a:extLst>
+            </p:cNvPr>
+            <p:cNvSpPr txBox="1"/>
+            <p:nvPr/>
+          </p:nvSpPr>
+          <p:spPr>
+            <a:xfrm>
+              <a:off x="973070" y="1875538"/>
+              <a:ext cx="1068664" cy="736740"/>
+            </a:xfrm>
+            <a:prstGeom prst="rect">
+              <a:avLst/>
+            </a:prstGeom>
+            <a:noFill/>
+          </p:spPr>
+          <p:txBody>
+            <a:bodyPr wrap="square" lIns="0" tIns="0" rIns="0" bIns="0" rtlCol="0">
+              <a:spAutoFit/>
+            </a:bodyPr>
+            <a:lstStyle/>
+            <a:p>
+              <a:pPr algn="ctr">
+                <a:lnSpc>
+                  <a:spcPct val="114000"/>
+                </a:lnSpc>
+              </a:pPr>
+              <a:r>
+                <a:rPr lang="en-US" sz="1400" dirty="0">
+                  <a:solidFill>
+                    <a:srgbClr val="283648"/>
+                  </a:solidFill>
+                  <a:latin typeface="Mulish" pitchFamily="2" charset="0"/>
+                </a:rPr>
+                <a:t>Kick-Off </a:t>
+              </a:r>
+              <a:r>
+                <a:rPr lang="en-US" sz="1400" dirty="0" smtClean="0">
+                  <a:solidFill>
+                    <a:srgbClr val="283648"/>
+                  </a:solidFill>
+                  <a:latin typeface="Mulish" pitchFamily="2" charset="0"/>
+                </a:rPr>
+                <a:t>2. mFUND </a:t>
+              </a:r>
+              <a:r>
+                <a:rPr lang="en-US" sz="1400" dirty="0">
+                  <a:solidFill>
+                    <a:srgbClr val="283648"/>
+                  </a:solidFill>
+                  <a:latin typeface="Mulish" pitchFamily="2" charset="0"/>
+                </a:rPr>
+                <a:t>funding</a:t>
+              </a:r>
+            </a:p>
+          </p:txBody>
+        </p:sp>
+      </p:grpSp>
+      <p:sp>
+        <p:nvSpPr>
+          <p:cNvPr id="50" name="Textfeld 49">
+            <a:extLst>
+              <a:ext uri="{FF2B5EF4-FFF2-40B4-BE49-F238E27FC236}">
+                <a16:creationId xmlns:a16="http://schemas.microsoft.com/office/drawing/2014/main" id="{70997DFD-CC06-A146-BFA8-6153849640E3}"/>
+              </a:ext>
+            </a:extLst>
+          </p:cNvPr>
+          <p:cNvSpPr txBox="1"/>
+          <p:nvPr/>
+        </p:nvSpPr>
+        <p:spPr>
+          <a:xfrm>
+            <a:off x="8400624" y="4155752"/>
+            <a:ext cx="526729" cy="227113"/>
+          </a:xfrm>
+          <a:prstGeom prst="rect">
+            <a:avLst/>
+          </a:prstGeom>
+          <a:noFill/>
+        </p:spPr>
+        <p:txBody>
+          <a:bodyPr wrap="square" lIns="0" tIns="0" rIns="0" bIns="0" rtlCol="0">
+            <a:spAutoFit/>
+          </a:bodyPr>
+          <a:lstStyle/>
+          <a:p>
+            <a:pPr algn="ctr">
+              <a:lnSpc>
+                <a:spcPct val="114000"/>
+              </a:lnSpc>
+            </a:pPr>
+            <a:r>
+              <a:rPr lang="de-DE" sz="1400" dirty="0" smtClean="0">
+                <a:latin typeface="Mulish" pitchFamily="2" charset="0"/>
+              </a:rPr>
+              <a:t>2022</a:t>
+            </a:r>
+            <a:endParaRPr lang="en-US" sz="1400" dirty="0" err="1">
+              <a:latin typeface="Mulish" pitchFamily="2" charset="0"/>
+            </a:endParaRPr>
+          </a:p>
+        </p:txBody>
+      </p:sp>
+      <p:sp>
+        <p:nvSpPr>
+          <p:cNvPr id="51" name="Nach oben gekrümmter Pfeil 50">
+            <a:extLst>
+              <a:ext uri="{FF2B5EF4-FFF2-40B4-BE49-F238E27FC236}">
+                <a16:creationId xmlns:a16="http://schemas.microsoft.com/office/drawing/2014/main" id="{F945F35A-BFA0-5D44-8A1A-F8B402FC423C}"/>
+              </a:ext>
+            </a:extLst>
+          </p:cNvPr>
+          <p:cNvSpPr/>
+          <p:nvPr/>
+        </p:nvSpPr>
+        <p:spPr>
+          <a:xfrm rot="16200000">
+            <a:off x="8658146" y="3660088"/>
+            <a:ext cx="204709" cy="148277"/>
+          </a:xfrm>
+          <a:prstGeom prst="curvedUpArrow">
+            <a:avLst/>
+          </a:prstGeom>
+          <a:solidFill>
+            <a:srgbClr val="283648"/>
+          </a:solidFill>
+          <a:ln>
+            <a:noFill/>
+          </a:ln>
+        </p:spPr>
+        <p:style>
+          <a:lnRef idx="2">
+            <a:schemeClr val="accent1">
+              <a:shade val="50000"/>
+            </a:schemeClr>
+          </a:lnRef>
+          <a:fillRef idx="1">
+            <a:schemeClr val="accent1"/>
+          </a:fillRef>
+          <a:effectRef idx="0">
+            <a:schemeClr val="accent1"/>
+          </a:effectRef>
+          <a:fontRef idx="minor">
+            <a:schemeClr val="lt1"/>
+          </a:fontRef>
+        </p:style>
+        <p:txBody>
+          <a:bodyPr rot="0" spcFirstLastPara="0" vertOverflow="overflow" horzOverflow="overflow" vert="horz" wrap="square" lIns="91440" tIns="45720" rIns="91440" bIns="45720" numCol="1" spcCol="0" rtlCol="0" fromWordArt="0" anchor="t" anchorCtr="0" forceAA="0" compatLnSpc="1">
+            <a:prstTxWarp prst="textNoShape">
+              <a:avLst/>
+            </a:prstTxWarp>
+            <a:noAutofit/>
+          </a:bodyPr>
+          <a:lstStyle/>
+          <a:p>
+            <a:pPr algn="ctr">
+              <a:lnSpc>
+                <a:spcPct val="114000"/>
+              </a:lnSpc>
+            </a:pPr>
+            <a:endParaRPr lang="en-US" dirty="0">
+              <a:solidFill>
+                <a:schemeClr val="tx1"/>
+              </a:solidFill>
+              <a:latin typeface="Mulish" pitchFamily="2" charset="0"/>
+            </a:endParaRPr>
+          </a:p>
+        </p:txBody>
+      </p:sp>
+      <p:sp>
+        <p:nvSpPr>
+          <p:cNvPr id="60" name="Nach oben gekrümmter Pfeil 59">
+            <a:extLst>
+              <a:ext uri="{FF2B5EF4-FFF2-40B4-BE49-F238E27FC236}">
+                <a16:creationId xmlns:a16="http://schemas.microsoft.com/office/drawing/2014/main" id="{3D0E118E-FFF6-B844-BEC3-3A11AF7B3F5A}"/>
+              </a:ext>
+            </a:extLst>
+          </p:cNvPr>
+          <p:cNvSpPr/>
+          <p:nvPr/>
+        </p:nvSpPr>
+        <p:spPr>
+          <a:xfrm rot="16200000" flipH="1" flipV="1">
+            <a:off x="8472439" y="3682491"/>
+            <a:ext cx="204709" cy="148277"/>
+          </a:xfrm>
+          <a:prstGeom prst="curvedUpArrow">
+            <a:avLst/>
+          </a:prstGeom>
+          <a:solidFill>
+            <a:srgbClr val="283648"/>
+          </a:solidFill>
+          <a:ln>
+            <a:noFill/>
+          </a:ln>
+        </p:spPr>
+        <p:style>
+          <a:lnRef idx="2">
+            <a:schemeClr val="accent1">
+              <a:shade val="50000"/>
+            </a:schemeClr>
+          </a:lnRef>
+          <a:fillRef idx="1">
+            <a:schemeClr val="accent1"/>
+          </a:fillRef>
+          <a:effectRef idx="0">
+            <a:schemeClr val="accent1"/>
+          </a:effectRef>
+          <a:fontRef idx="minor">
+            <a:schemeClr val="lt1"/>
+          </a:fontRef>
+        </p:style>
+        <p:txBody>
+          <a:bodyPr rot="0" spcFirstLastPara="0" vertOverflow="overflow" horzOverflow="overflow" vert="horz" wrap="square" lIns="91440" tIns="45720" rIns="91440" bIns="45720" numCol="1" spcCol="0" rtlCol="0" fromWordArt="0" anchor="t" anchorCtr="0" forceAA="0" compatLnSpc="1">
+            <a:prstTxWarp prst="textNoShape">
+              <a:avLst/>
+            </a:prstTxWarp>
+            <a:noAutofit/>
+          </a:bodyPr>
+          <a:lstStyle/>
+          <a:p>
+            <a:pPr algn="ctr">
+              <a:lnSpc>
+                <a:spcPct val="114000"/>
+              </a:lnSpc>
+            </a:pPr>
+            <a:endParaRPr lang="en-US" dirty="0">
+              <a:solidFill>
+                <a:schemeClr val="tx1"/>
+              </a:solidFill>
+              <a:latin typeface="Mulish" pitchFamily="2" charset="0"/>
+            </a:endParaRPr>
+          </a:p>
+        </p:txBody>
+      </p:sp>
+    </p:spTree>
+    <p:extLst>
+      <p:ext uri="{BB962C8B-B14F-4D97-AF65-F5344CB8AC3E}">
+        <p14:creationId xmlns:p14="http://schemas.microsoft.com/office/powerpoint/2010/main" val="697187499"/>
       </p:ext>
     </p:extLst>
   </p:cSld>

</xml_diff>

<commit_message>
image improvements - goat 3.0
</commit_message>
<xml_diff>
--- a/uploads/homepage/timeline.pptx
+++ b/uploads/homepage/timeline.pptx
@@ -9501,7 +9501,7 @@
         </p:nvSpPr>
         <p:spPr>
           <a:xfrm>
-            <a:off x="290972" y="884379"/>
+            <a:off x="250168" y="831939"/>
             <a:ext cx="10103759" cy="5728138"/>
           </a:xfrm>
           <a:prstGeom prst="rect">
@@ -9556,7 +9556,7 @@
         </p:nvSpPr>
         <p:spPr>
           <a:xfrm>
-            <a:off x="708917" y="3748448"/>
+            <a:off x="708917" y="3429951"/>
             <a:ext cx="9322140" cy="558266"/>
           </a:xfrm>
           <a:prstGeom prst="rightArrow">
@@ -9601,7 +9601,7 @@
                 <a:spcPct val="114000"/>
               </a:lnSpc>
             </a:pPr>
-            <a:endParaRPr lang="en-US" dirty="0">
+            <a:endParaRPr lang="en-US" sz="2000" dirty="0">
               <a:solidFill>
                 <a:schemeClr val="tx1"/>
               </a:solidFill>
@@ -9624,7 +9624,7 @@
         </p:nvSpPr>
         <p:spPr>
           <a:xfrm>
-            <a:off x="7296921" y="3754488"/>
+            <a:off x="7296921" y="3435991"/>
             <a:ext cx="2734136" cy="552226"/>
           </a:xfrm>
           <a:prstGeom prst="rightArrow">
@@ -9656,7 +9656,7 @@
           </a:fontRef>
         </p:style>
         <p:txBody>
-          <a:bodyPr rot="0" spcFirstLastPara="0" vertOverflow="overflow" horzOverflow="overflow" vert="horz" wrap="square" lIns="91440" tIns="45720" rIns="91440" bIns="45720" numCol="1" spcCol="0" rtlCol="0" fromWordArt="0" anchor="t" anchorCtr="0" forceAA="0" compatLnSpc="1">
+          <a:bodyPr rot="0" spcFirstLastPara="0" vertOverflow="overflow" horzOverflow="overflow" vert="horz" wrap="square" lIns="91440" tIns="45720" rIns="91440" bIns="45720" numCol="1" spcCol="0" rtlCol="0" fromWordArt="0" anchor="ctr" anchorCtr="0" forceAA="0" compatLnSpc="1">
             <a:prstTxWarp prst="textNoShape">
               <a:avLst/>
             </a:prstTxWarp>
@@ -9670,15 +9670,24 @@
               </a:lnSpc>
             </a:pPr>
             <a:r>
-              <a:rPr lang="en-US" sz="1200" b="1" dirty="0" smtClean="0">
+              <a:rPr lang="en-US" sz="1400" b="1" dirty="0" smtClean="0">
                 <a:solidFill>
                   <a:schemeClr val="bg1"/>
                 </a:solidFill>
                 <a:latin typeface="Mulish" pitchFamily="2" charset="0"/>
               </a:rPr>
-              <a:t>mFUND project “GOAT 3.0”</a:t>
+              <a:t> mFUND </a:t>
             </a:r>
-            <a:endParaRPr lang="en-US" sz="1200" b="1" dirty="0">
+            <a:r>
+              <a:rPr lang="en-US" sz="1400" b="1" dirty="0" smtClean="0">
+                <a:solidFill>
+                  <a:schemeClr val="bg1"/>
+                </a:solidFill>
+                <a:latin typeface="Mulish" pitchFamily="2" charset="0"/>
+              </a:rPr>
+              <a:t>project “GOAT 3.0”</a:t>
+            </a:r>
+            <a:endParaRPr lang="en-US" sz="1400" b="1" dirty="0">
               <a:solidFill>
                 <a:schemeClr val="bg1"/>
               </a:solidFill>
@@ -9695,7 +9704,7 @@
         </p:nvSpPr>
         <p:spPr>
           <a:xfrm>
-            <a:off x="2573223" y="3884434"/>
+            <a:off x="2573223" y="3565937"/>
             <a:ext cx="3495265" cy="280192"/>
           </a:xfrm>
           <a:prstGeom prst="rect">
@@ -9732,7 +9741,7 @@
           <a:p>
             <a:pPr algn="ctr"/>
             <a:r>
-              <a:rPr lang="en-US" sz="1200" b="1" dirty="0">
+              <a:rPr lang="en-US" sz="1400" b="1" dirty="0">
                 <a:solidFill>
                   <a:schemeClr val="bg1"/>
                 </a:solidFill>
@@ -9757,8 +9766,8 @@
         </p:nvSpPr>
         <p:spPr>
           <a:xfrm>
-            <a:off x="783023" y="4164626"/>
-            <a:ext cx="526729" cy="245580"/>
+            <a:off x="783023" y="3876951"/>
+            <a:ext cx="526729" cy="280718"/>
           </a:xfrm>
           <a:prstGeom prst="rect">
             <a:avLst/>
@@ -9777,12 +9786,12 @@
               </a:lnSpc>
             </a:pPr>
             <a:r>
-              <a:rPr lang="de-DE" sz="1400" dirty="0">
+              <a:rPr lang="de-DE" sz="1600" dirty="0">
                 <a:latin typeface="Mulish" pitchFamily="2" charset="0"/>
               </a:rPr>
               <a:t>2017</a:t>
             </a:r>
-            <a:endParaRPr lang="en-US" sz="1400" dirty="0" err="1">
+            <a:endParaRPr lang="en-US" sz="1600" dirty="0" err="1">
               <a:latin typeface="Mulish" pitchFamily="2" charset="0"/>
             </a:endParaRPr>
           </a:p>
@@ -9802,8 +9811,8 @@
         </p:nvSpPr>
         <p:spPr>
           <a:xfrm>
-            <a:off x="1430590" y="3910831"/>
-            <a:ext cx="526729" cy="245580"/>
+            <a:off x="1430590" y="3592334"/>
+            <a:ext cx="526729" cy="280718"/>
           </a:xfrm>
           <a:prstGeom prst="rect">
             <a:avLst/>
@@ -9822,12 +9831,12 @@
               </a:lnSpc>
             </a:pPr>
             <a:r>
-              <a:rPr lang="de-DE" sz="1400" dirty="0">
+              <a:rPr lang="de-DE" sz="1600" dirty="0">
                 <a:latin typeface="Mulish" pitchFamily="2" charset="0"/>
               </a:rPr>
               <a:t>…</a:t>
             </a:r>
-            <a:endParaRPr lang="en-US" sz="1400" dirty="0" err="1">
+            <a:endParaRPr lang="en-US" sz="1600" dirty="0" err="1">
               <a:latin typeface="Mulish" pitchFamily="2" charset="0"/>
             </a:endParaRPr>
           </a:p>
@@ -9847,8 +9856,8 @@
         </p:nvSpPr>
         <p:spPr>
           <a:xfrm>
-            <a:off x="6284109" y="4164626"/>
-            <a:ext cx="526729" cy="245580"/>
+            <a:off x="6284109" y="3876951"/>
+            <a:ext cx="526729" cy="280718"/>
           </a:xfrm>
           <a:prstGeom prst="rect">
             <a:avLst/>
@@ -9867,12 +9876,12 @@
               </a:lnSpc>
             </a:pPr>
             <a:r>
-              <a:rPr lang="de-DE" sz="1400" dirty="0">
+              <a:rPr lang="de-DE" sz="1600" dirty="0">
                 <a:latin typeface="Mulish" pitchFamily="2" charset="0"/>
               </a:rPr>
               <a:t>2021</a:t>
             </a:r>
-            <a:endParaRPr lang="en-US" sz="1400" dirty="0" err="1">
+            <a:endParaRPr lang="en-US" sz="1600" dirty="0" err="1">
               <a:latin typeface="Mulish" pitchFamily="2" charset="0"/>
             </a:endParaRPr>
           </a:p>
@@ -9892,8 +9901,8 @@
         </p:nvSpPr>
         <p:spPr>
           <a:xfrm>
-            <a:off x="613677" y="2376917"/>
-            <a:ext cx="910506" cy="227113"/>
+            <a:off x="613677" y="2058420"/>
+            <a:ext cx="1041952" cy="280718"/>
           </a:xfrm>
           <a:prstGeom prst="rect">
             <a:avLst/>
@@ -9912,7 +9921,7 @@
               </a:lnSpc>
             </a:pPr>
             <a:r>
-              <a:rPr lang="en-US" sz="1400" dirty="0">
+              <a:rPr lang="en-US" sz="1600" dirty="0">
                 <a:solidFill>
                   <a:srgbClr val="283648"/>
                 </a:solidFill>
@@ -9921,7 +9930,7 @@
               <a:t>1. </a:t>
             </a:r>
             <a:r>
-              <a:rPr lang="en-US" sz="1400" dirty="0" err="1">
+              <a:rPr lang="en-US" sz="1600" dirty="0" err="1">
                 <a:solidFill>
                   <a:srgbClr val="283648"/>
                 </a:solidFill>
@@ -9929,7 +9938,7 @@
               </a:rPr>
               <a:t>Prototyp</a:t>
             </a:r>
-            <a:endParaRPr lang="en-US" sz="1400" dirty="0">
+            <a:endParaRPr lang="en-US" sz="1600" dirty="0">
               <a:solidFill>
                 <a:srgbClr val="283648"/>
               </a:solidFill>
@@ -9952,7 +9961,7 @@
         </p:nvGrpSpPr>
         <p:grpSpPr>
           <a:xfrm>
-            <a:off x="2044423" y="1853968"/>
+            <a:off x="2044423" y="1535471"/>
             <a:ext cx="1068664" cy="2014018"/>
             <a:chOff x="973070" y="1875538"/>
             <a:chExt cx="1068664" cy="2014018"/>
@@ -10015,7 +10024,7 @@
           <p:spPr>
             <a:xfrm>
               <a:off x="973070" y="1875538"/>
-              <a:ext cx="1068664" cy="736740"/>
+              <a:ext cx="1068664" cy="842154"/>
             </a:xfrm>
             <a:prstGeom prst="rect">
               <a:avLst/>
@@ -10034,7 +10043,7 @@
                 </a:lnSpc>
               </a:pPr>
               <a:r>
-                <a:rPr lang="en-US" sz="1400" dirty="0">
+                <a:rPr lang="en-US" sz="1600" dirty="0">
                   <a:solidFill>
                     <a:srgbClr val="283648"/>
                   </a:solidFill>
@@ -10043,7 +10052,7 @@
                 <a:t>Kick-Off </a:t>
               </a:r>
               <a:r>
-                <a:rPr lang="en-US" sz="1400" dirty="0" smtClean="0">
+                <a:rPr lang="en-US" sz="1600" dirty="0" smtClean="0">
                   <a:solidFill>
                     <a:srgbClr val="283648"/>
                   </a:solidFill>
@@ -10052,7 +10061,7 @@
                 <a:t>1. mFUND </a:t>
               </a:r>
               <a:r>
-                <a:rPr lang="en-US" sz="1400" dirty="0">
+                <a:rPr lang="en-US" sz="1600" dirty="0">
                   <a:solidFill>
                     <a:srgbClr val="283648"/>
                   </a:solidFill>
@@ -10078,7 +10087,7 @@
         </p:nvCxnSpPr>
         <p:spPr>
           <a:xfrm>
-            <a:off x="1896394" y="3884435"/>
+            <a:off x="1896394" y="3565938"/>
             <a:ext cx="0" cy="280688"/>
           </a:xfrm>
           <a:prstGeom prst="line">
@@ -10114,7 +10123,7 @@
         </p:nvCxnSpPr>
         <p:spPr>
           <a:xfrm>
-            <a:off x="1430590" y="3884435"/>
+            <a:off x="1430590" y="3565938"/>
             <a:ext cx="0" cy="280688"/>
           </a:xfrm>
           <a:prstGeom prst="line">
@@ -10150,10 +10159,10 @@
         </p:nvGrpSpPr>
         <p:grpSpPr>
           <a:xfrm>
-            <a:off x="5326137" y="4159141"/>
-            <a:ext cx="1548795" cy="2059327"/>
+            <a:off x="5326137" y="3840644"/>
+            <a:ext cx="1548795" cy="2445458"/>
             <a:chOff x="5463654" y="4159141"/>
-            <a:chExt cx="1548795" cy="2059327"/>
+            <a:chExt cx="1548795" cy="2445458"/>
           </a:xfrm>
         </p:grpSpPr>
         <p:sp>
@@ -10171,7 +10180,7 @@
           <p:spPr>
             <a:xfrm>
               <a:off x="5463654" y="5481728"/>
-              <a:ext cx="1548795" cy="736740"/>
+              <a:ext cx="1548795" cy="1122871"/>
             </a:xfrm>
             <a:prstGeom prst="rect">
               <a:avLst/>
@@ -10190,7 +10199,7 @@
                 </a:lnSpc>
               </a:pPr>
               <a:r>
-                <a:rPr lang="en-US" sz="1400" dirty="0">
+                <a:rPr lang="en-US" sz="1600" dirty="0">
                   <a:latin typeface="Mulish" pitchFamily="2" charset="0"/>
                 </a:rPr>
                 <a:t>Release GOAT 1.0</a:t>
@@ -10203,12 +10212,12 @@
                 </a:lnSpc>
               </a:pPr>
               <a:r>
-                <a:rPr lang="en-US" sz="1400" dirty="0" smtClean="0">
+                <a:rPr lang="en-US" sz="1600" dirty="0" smtClean="0">
                   <a:latin typeface="Mulish" pitchFamily="2" charset="0"/>
                 </a:rPr>
                 <a:t>End of 1. mFUND funding</a:t>
               </a:r>
-              <a:endParaRPr lang="en-US" sz="1400" dirty="0">
+              <a:endParaRPr lang="en-US" sz="1600" dirty="0">
                 <a:latin typeface="Mulish" pitchFamily="2" charset="0"/>
               </a:endParaRPr>
             </a:p>
@@ -10307,10 +10316,10 @@
         </p:nvGrpSpPr>
         <p:grpSpPr>
           <a:xfrm>
-            <a:off x="5094189" y="2014407"/>
-            <a:ext cx="1503609" cy="1871234"/>
-            <a:chOff x="4782971" y="2014407"/>
-            <a:chExt cx="1503609" cy="1871234"/>
+            <a:off x="5094189" y="1439060"/>
+            <a:ext cx="1503609" cy="2128084"/>
+            <a:chOff x="4782971" y="1757557"/>
+            <a:chExt cx="1503609" cy="2128084"/>
           </a:xfrm>
         </p:grpSpPr>
         <p:cxnSp>
@@ -10404,8 +10413,8 @@
           </p:nvSpPr>
           <p:spPr>
             <a:xfrm>
-              <a:off x="4782971" y="2014407"/>
-              <a:ext cx="1503609" cy="227113"/>
+              <a:off x="4782971" y="1757557"/>
+              <a:ext cx="1503609" cy="561436"/>
             </a:xfrm>
             <a:prstGeom prst="rect">
               <a:avLst/>
@@ -10424,7 +10433,7 @@
                 </a:lnSpc>
               </a:pPr>
               <a:r>
-                <a:rPr lang="en-US" sz="1400" dirty="0">
+                <a:rPr lang="en-US" sz="1600" dirty="0">
                   <a:solidFill>
                     <a:srgbClr val="283648"/>
                   </a:solidFill>
@@ -10450,8 +10459,8 @@
         </p:nvSpPr>
         <p:spPr>
           <a:xfrm>
-            <a:off x="7626384" y="2861066"/>
-            <a:ext cx="2046033" cy="718274"/>
+            <a:off x="7724925" y="1884018"/>
+            <a:ext cx="1878125" cy="1403589"/>
           </a:xfrm>
           <a:prstGeom prst="rect">
             <a:avLst/>
@@ -10470,7 +10479,7 @@
               </a:lnSpc>
             </a:pPr>
             <a:r>
-              <a:rPr lang="en-US" sz="1400" b="1" dirty="0">
+              <a:rPr lang="en-US" sz="1600" b="1" dirty="0">
                 <a:solidFill>
                   <a:srgbClr val="283648"/>
                 </a:solidFill>
@@ -10479,7 +10488,7 @@
               <a:t>Further </a:t>
             </a:r>
             <a:r>
-              <a:rPr lang="en-US" sz="1400" b="1" dirty="0" smtClean="0">
+              <a:rPr lang="en-US" sz="1600" b="1" dirty="0" smtClean="0">
                 <a:solidFill>
                   <a:srgbClr val="283648"/>
                 </a:solidFill>
@@ -10488,7 +10497,7 @@
               <a:t>development and application </a:t>
             </a:r>
             <a:r>
-              <a:rPr lang="en-US" sz="1400" b="1" dirty="0">
+              <a:rPr lang="en-US" sz="1600" b="1" dirty="0">
                 <a:solidFill>
                   <a:srgbClr val="283648"/>
                 </a:solidFill>
@@ -10507,10 +10516,10 @@
         </p:nvGrpSpPr>
         <p:grpSpPr>
           <a:xfrm>
-            <a:off x="3425788" y="2349514"/>
-            <a:ext cx="1503609" cy="1476176"/>
-            <a:chOff x="2525098" y="4657356"/>
-            <a:chExt cx="1503609" cy="1476176"/>
+            <a:off x="3425788" y="1846085"/>
+            <a:ext cx="1503609" cy="1661108"/>
+            <a:chOff x="2525098" y="4472424"/>
+            <a:chExt cx="1503609" cy="1661108"/>
           </a:xfrm>
         </p:grpSpPr>
         <p:sp>
@@ -10527,8 +10536,8 @@
           </p:nvSpPr>
           <p:spPr>
             <a:xfrm>
-              <a:off x="2525098" y="4657356"/>
-              <a:ext cx="1503609" cy="1227900"/>
+              <a:off x="2525098" y="4472424"/>
+              <a:ext cx="1503609" cy="1403589"/>
             </a:xfrm>
             <a:prstGeom prst="rect">
               <a:avLst/>
@@ -10547,7 +10556,7 @@
                 </a:lnSpc>
               </a:pPr>
               <a:r>
-                <a:rPr lang="en-US" sz="1400" b="1" dirty="0" smtClean="0">
+                <a:rPr lang="en-US" sz="1600" b="1" dirty="0" smtClean="0">
                   <a:solidFill>
                     <a:srgbClr val="283648"/>
                   </a:solidFill>
@@ -10556,7 +10565,7 @@
                 <a:t>Co-creative development</a:t>
               </a:r>
               <a:r>
-                <a:rPr lang="en-US" sz="1400" dirty="0" smtClean="0">
+                <a:rPr lang="en-US" sz="1600" dirty="0" smtClean="0">
                   <a:solidFill>
                     <a:srgbClr val="283648"/>
                   </a:solidFill>
@@ -10565,7 +10574,7 @@
                 <a:t/>
               </a:r>
               <a:br>
-                <a:rPr lang="en-US" sz="1400" dirty="0" smtClean="0">
+                <a:rPr lang="en-US" sz="1600" dirty="0" smtClean="0">
                   <a:solidFill>
                     <a:srgbClr val="283648"/>
                   </a:solidFill>
@@ -10573,7 +10582,7 @@
                 </a:rPr>
               </a:br>
               <a:r>
-                <a:rPr lang="en-US" sz="1400" dirty="0" smtClean="0">
+                <a:rPr lang="en-US" sz="1600" dirty="0" smtClean="0">
                   <a:solidFill>
                     <a:srgbClr val="283648"/>
                   </a:solidFill>
@@ -10581,7 +10590,7 @@
                 </a:rPr>
                 <a:t>10 workshops with different municipalities </a:t>
               </a:r>
-              <a:endParaRPr lang="en-US" sz="1400" dirty="0">
+              <a:endParaRPr lang="en-US" sz="1600" dirty="0">
                 <a:solidFill>
                   <a:srgbClr val="283648"/>
                 </a:solidFill>
@@ -10647,7 +10656,7 @@
                   <a:spcPct val="114000"/>
                 </a:lnSpc>
               </a:pPr>
-              <a:endParaRPr lang="en-US" dirty="0">
+              <a:endParaRPr lang="en-US" sz="2000" dirty="0">
                 <a:solidFill>
                   <a:schemeClr val="tx1"/>
                 </a:solidFill>
@@ -10713,7 +10722,7 @@
                   <a:spcPct val="114000"/>
                 </a:lnSpc>
               </a:pPr>
-              <a:endParaRPr lang="en-US" dirty="0">
+              <a:endParaRPr lang="en-US" sz="2000" dirty="0">
                 <a:solidFill>
                   <a:schemeClr val="tx1"/>
                 </a:solidFill>
@@ -10737,8 +10746,8 @@
         </p:nvSpPr>
         <p:spPr>
           <a:xfrm>
-            <a:off x="2023508" y="4156411"/>
-            <a:ext cx="526729" cy="227113"/>
+            <a:off x="2023508" y="3868736"/>
+            <a:ext cx="526729" cy="280718"/>
           </a:xfrm>
           <a:prstGeom prst="rect">
             <a:avLst/>
@@ -10757,12 +10766,12 @@
               </a:lnSpc>
             </a:pPr>
             <a:r>
-              <a:rPr lang="de-DE" sz="1400" dirty="0" smtClean="0">
+              <a:rPr lang="de-DE" sz="1600" dirty="0" smtClean="0">
                 <a:latin typeface="Mulish" pitchFamily="2" charset="0"/>
               </a:rPr>
               <a:t>2019</a:t>
             </a:r>
-            <a:endParaRPr lang="en-US" sz="1400" dirty="0" err="1">
+            <a:endParaRPr lang="en-US" sz="1600" dirty="0" err="1">
               <a:latin typeface="Mulish" pitchFamily="2" charset="0"/>
             </a:endParaRPr>
           </a:p>
@@ -10782,7 +10791,7 @@
         </p:nvCxnSpPr>
         <p:spPr>
           <a:xfrm>
-            <a:off x="2685792" y="3884435"/>
+            <a:off x="2685792" y="3565938"/>
             <a:ext cx="0" cy="280688"/>
           </a:xfrm>
           <a:prstGeom prst="line">
@@ -10818,7 +10827,7 @@
         </p:nvCxnSpPr>
         <p:spPr>
           <a:xfrm>
-            <a:off x="5687270" y="3884435"/>
+            <a:off x="5687270" y="3555664"/>
             <a:ext cx="0" cy="280688"/>
           </a:xfrm>
           <a:prstGeom prst="line">
@@ -10854,7 +10863,7 @@
         </p:nvCxnSpPr>
         <p:spPr>
           <a:xfrm>
-            <a:off x="1046388" y="2757570"/>
+            <a:off x="1046388" y="2439073"/>
             <a:ext cx="1" cy="1110415"/>
           </a:xfrm>
           <a:prstGeom prst="line">
@@ -10896,8 +10905,8 @@
         </p:nvSpPr>
         <p:spPr>
           <a:xfrm>
-            <a:off x="3914227" y="4164626"/>
-            <a:ext cx="526729" cy="227113"/>
+            <a:off x="3914227" y="3876951"/>
+            <a:ext cx="526729" cy="280718"/>
           </a:xfrm>
           <a:prstGeom prst="rect">
             <a:avLst/>
@@ -10916,12 +10925,12 @@
               </a:lnSpc>
             </a:pPr>
             <a:r>
-              <a:rPr lang="de-DE" sz="1400" dirty="0" smtClean="0">
+              <a:rPr lang="de-DE" sz="1600" dirty="0" smtClean="0">
                 <a:latin typeface="Mulish" pitchFamily="2" charset="0"/>
               </a:rPr>
               <a:t>2020</a:t>
             </a:r>
-            <a:endParaRPr lang="en-US" sz="1400" dirty="0" err="1">
+            <a:endParaRPr lang="en-US" sz="1600" dirty="0" err="1">
               <a:latin typeface="Mulish" pitchFamily="2" charset="0"/>
             </a:endParaRPr>
           </a:p>
@@ -10941,7 +10950,7 @@
         </p:nvCxnSpPr>
         <p:spPr>
           <a:xfrm>
-            <a:off x="7422936" y="3893277"/>
+            <a:off x="7422936" y="3564506"/>
             <a:ext cx="0" cy="280688"/>
           </a:xfrm>
           <a:prstGeom prst="line">
@@ -10977,7 +10986,7 @@
         </p:nvGrpSpPr>
         <p:grpSpPr>
           <a:xfrm>
-            <a:off x="6762589" y="1853228"/>
+            <a:off x="6762589" y="1534731"/>
             <a:ext cx="1068664" cy="2014018"/>
             <a:chOff x="973070" y="1875538"/>
             <a:chExt cx="1068664" cy="2014018"/>
@@ -11040,7 +11049,7 @@
           <p:spPr>
             <a:xfrm>
               <a:off x="973070" y="1875538"/>
-              <a:ext cx="1068664" cy="736740"/>
+              <a:ext cx="1068664" cy="842154"/>
             </a:xfrm>
             <a:prstGeom prst="rect">
               <a:avLst/>
@@ -11059,7 +11068,7 @@
                 </a:lnSpc>
               </a:pPr>
               <a:r>
-                <a:rPr lang="en-US" sz="1400" dirty="0">
+                <a:rPr lang="en-US" sz="1600" dirty="0">
                   <a:solidFill>
                     <a:srgbClr val="283648"/>
                   </a:solidFill>
@@ -11068,7 +11077,7 @@
                 <a:t>Kick-Off </a:t>
               </a:r>
               <a:r>
-                <a:rPr lang="en-US" sz="1400" dirty="0" smtClean="0">
+                <a:rPr lang="en-US" sz="1600" dirty="0" smtClean="0">
                   <a:solidFill>
                     <a:srgbClr val="283648"/>
                   </a:solidFill>
@@ -11077,7 +11086,7 @@
                 <a:t>2. mFUND </a:t>
               </a:r>
               <a:r>
-                <a:rPr lang="en-US" sz="1400" dirty="0">
+                <a:rPr lang="en-US" sz="1600" dirty="0">
                   <a:solidFill>
                     <a:srgbClr val="283648"/>
                   </a:solidFill>
@@ -11103,8 +11112,8 @@
         </p:nvSpPr>
         <p:spPr>
           <a:xfrm>
-            <a:off x="8400624" y="4155752"/>
-            <a:ext cx="526729" cy="227113"/>
+            <a:off x="8400624" y="3868077"/>
+            <a:ext cx="526729" cy="280718"/>
           </a:xfrm>
           <a:prstGeom prst="rect">
             <a:avLst/>
@@ -11123,12 +11132,12 @@
               </a:lnSpc>
             </a:pPr>
             <a:r>
-              <a:rPr lang="de-DE" sz="1400" dirty="0" smtClean="0">
+              <a:rPr lang="de-DE" sz="1600" dirty="0" smtClean="0">
                 <a:latin typeface="Mulish" pitchFamily="2" charset="0"/>
               </a:rPr>
               <a:t>2022</a:t>
             </a:r>
-            <a:endParaRPr lang="en-US" sz="1400" dirty="0" err="1">
+            <a:endParaRPr lang="en-US" sz="1600" dirty="0" err="1">
               <a:latin typeface="Mulish" pitchFamily="2" charset="0"/>
             </a:endParaRPr>
           </a:p>
@@ -11148,7 +11157,7 @@
         </p:nvSpPr>
         <p:spPr>
           <a:xfrm rot="16200000">
-            <a:off x="8658146" y="3660088"/>
+            <a:off x="8658146" y="3341591"/>
             <a:ext cx="204709" cy="148277"/>
           </a:xfrm>
           <a:prstGeom prst="curvedUpArrow">
@@ -11191,7 +11200,7 @@
                 <a:spcPct val="114000"/>
               </a:lnSpc>
             </a:pPr>
-            <a:endParaRPr lang="en-US" dirty="0">
+            <a:endParaRPr lang="en-US" sz="2000" dirty="0">
               <a:solidFill>
                 <a:schemeClr val="tx1"/>
               </a:solidFill>
@@ -11214,7 +11223,7 @@
         </p:nvSpPr>
         <p:spPr>
           <a:xfrm rot="16200000" flipH="1" flipV="1">
-            <a:off x="8472439" y="3682491"/>
+            <a:off x="8472439" y="3363994"/>
             <a:ext cx="204709" cy="148277"/>
           </a:xfrm>
           <a:prstGeom prst="curvedUpArrow">
@@ -11257,7 +11266,7 @@
                 <a:spcPct val="114000"/>
               </a:lnSpc>
             </a:pPr>
-            <a:endParaRPr lang="en-US" dirty="0">
+            <a:endParaRPr lang="en-US" sz="2000" dirty="0">
               <a:solidFill>
                 <a:schemeClr val="tx1"/>
               </a:solidFill>

</xml_diff>